<commit_message>
complete the final report ...
</commit_message>
<xml_diff>
--- a/PRESENTATION/https.pptx
+++ b/PRESENTATION/https.pptx
@@ -28,17 +28,17 @@
     <p:sldId id="269" r:id="rId19"/>
     <p:sldId id="270" r:id="rId20"/>
     <p:sldId id="271" r:id="rId21"/>
-    <p:sldId id="272" r:id="rId22"/>
-    <p:sldId id="273" r:id="rId23"/>
-    <p:sldId id="274" r:id="rId24"/>
-    <p:sldId id="275" r:id="rId25"/>
-    <p:sldId id="276" r:id="rId26"/>
-    <p:sldId id="294" r:id="rId27"/>
-    <p:sldId id="280" r:id="rId28"/>
-    <p:sldId id="295" r:id="rId29"/>
-    <p:sldId id="288" r:id="rId30"/>
-    <p:sldId id="296" r:id="rId31"/>
-    <p:sldId id="281" r:id="rId32"/>
+    <p:sldId id="273" r:id="rId22"/>
+    <p:sldId id="274" r:id="rId23"/>
+    <p:sldId id="275" r:id="rId24"/>
+    <p:sldId id="276" r:id="rId25"/>
+    <p:sldId id="294" r:id="rId26"/>
+    <p:sldId id="280" r:id="rId27"/>
+    <p:sldId id="295" r:id="rId28"/>
+    <p:sldId id="288" r:id="rId29"/>
+    <p:sldId id="296" r:id="rId30"/>
+    <p:sldId id="281" r:id="rId31"/>
+    <p:sldId id="297" r:id="rId32"/>
   </p:sldIdLst>
   <p:sldSz cx="12192000" cy="6858000"/>
   <p:notesSz cx="6858000" cy="9144000"/>
@@ -7090,43 +7090,8 @@
                 <a:latin typeface="B Nazanin+ Regular" panose="01000506000000020004" pitchFamily="2" charset="-78"/>
                 <a:cs typeface="B Nazanin+ Regular" panose="01000506000000020004" pitchFamily="2" charset="-78"/>
               </a:rPr>
-              <a:t> </a:t>
-            </a:r>
-            <a:r>
-              <a:rPr lang="fa-IR" sz="4000" b="1" dirty="0" smtClean="0">
-                <a:solidFill>
-                  <a:schemeClr val="accent1">
-                    <a:lumMod val="75000"/>
-                  </a:schemeClr>
-                </a:solidFill>
-                <a:effectLst>
-                  <a:outerShdw blurRad="38100" dist="38100" dir="2700000" algn="tl">
-                    <a:srgbClr val="000000">
-                      <a:alpha val="43137"/>
-                    </a:srgbClr>
-                  </a:outerShdw>
-                </a:effectLst>
-                <a:latin typeface="B Nazanin+ Regular" panose="01000506000000020004" pitchFamily="2" charset="-78"/>
-                <a:cs typeface="B Nazanin+ Regular" panose="01000506000000020004" pitchFamily="2" charset="-78"/>
-              </a:rPr>
-              <a:t>رمز گذاری</a:t>
-            </a:r>
-            <a:endParaRPr lang="fa-IR" sz="4000" b="1" dirty="0" smtClean="0">
-              <a:solidFill>
-                <a:schemeClr val="accent1">
-                  <a:lumMod val="75000"/>
-                </a:schemeClr>
-              </a:solidFill>
-              <a:effectLst>
-                <a:outerShdw blurRad="38100" dist="38100" dir="2700000" algn="tl">
-                  <a:srgbClr val="000000">
-                    <a:alpha val="43137"/>
-                  </a:srgbClr>
-                </a:outerShdw>
-              </a:effectLst>
-              <a:latin typeface="B Nazanin+ Regular" panose="01000506000000020004" pitchFamily="2" charset="-78"/>
-              <a:cs typeface="B Nazanin+ Regular" panose="01000506000000020004" pitchFamily="2" charset="-78"/>
-            </a:endParaRPr>
+              <a:t> رمز گذاری</a:t>
+            </a:r>
           </a:p>
           <a:p>
             <a:pPr algn="r" rtl="1">
@@ -7153,26 +7118,7 @@
                 <a:latin typeface="B Nazanin+ Regular" panose="01000506000000020004" pitchFamily="2" charset="-78"/>
                 <a:cs typeface="B Nazanin+ Regular" panose="01000506000000020004" pitchFamily="2" charset="-78"/>
               </a:rPr>
-              <a:t>  </a:t>
-            </a:r>
-            <a:r>
-              <a:rPr lang="fa-IR" sz="4000" b="1" dirty="0" smtClean="0">
-                <a:solidFill>
-                  <a:schemeClr val="accent1">
-                    <a:lumMod val="75000"/>
-                  </a:schemeClr>
-                </a:solidFill>
-                <a:effectLst>
-                  <a:outerShdw blurRad="38100" dist="38100" dir="2700000" algn="tl">
-                    <a:srgbClr val="000000">
-                      <a:alpha val="43137"/>
-                    </a:srgbClr>
-                  </a:outerShdw>
-                </a:effectLst>
-                <a:latin typeface="B Nazanin+ Regular" panose="01000506000000020004" pitchFamily="2" charset="-78"/>
-                <a:cs typeface="B Nazanin+ Regular" panose="01000506000000020004" pitchFamily="2" charset="-78"/>
-              </a:rPr>
-              <a:t>نتیجه گیری </a:t>
+              <a:t>  نتیجه گیری </a:t>
             </a:r>
             <a:endParaRPr lang="en-US" sz="4000" b="1" dirty="0" smtClean="0">
               <a:solidFill>
@@ -7216,26 +7162,7 @@
                 <a:latin typeface="B Nazanin+ Regular" panose="01000506000000020004" pitchFamily="2" charset="-78"/>
                 <a:cs typeface="B Nazanin+ Regular" panose="01000506000000020004" pitchFamily="2" charset="-78"/>
               </a:rPr>
-              <a:t> </a:t>
-            </a:r>
-            <a:r>
-              <a:rPr lang="fa-IR" sz="4000" b="1" dirty="0" smtClean="0">
-                <a:solidFill>
-                  <a:schemeClr val="accent1">
-                    <a:lumMod val="75000"/>
-                  </a:schemeClr>
-                </a:solidFill>
-                <a:effectLst>
-                  <a:outerShdw blurRad="38100" dist="38100" dir="2700000" algn="tl">
-                    <a:srgbClr val="000000">
-                      <a:alpha val="43137"/>
-                    </a:srgbClr>
-                  </a:outerShdw>
-                </a:effectLst>
-                <a:latin typeface="B Nazanin+ Regular" panose="01000506000000020004" pitchFamily="2" charset="-78"/>
-                <a:cs typeface="B Nazanin+ Regular" panose="01000506000000020004" pitchFamily="2" charset="-78"/>
-              </a:rPr>
-              <a:t> مراجع </a:t>
+              <a:t>  مراجع </a:t>
             </a:r>
             <a:endParaRPr lang="en-US" sz="4000" b="1" dirty="0">
               <a:solidFill>
@@ -7496,24 +7423,7 @@
                 <a:latin typeface="B Nazanin+ Regular" panose="01000506000000020004" pitchFamily="2" charset="-78"/>
                 <a:cs typeface="B Nazanin+ Regular" panose="01000506000000020004" pitchFamily="2" charset="-78"/>
               </a:rPr>
-              <a:t>HTTP + </a:t>
-            </a:r>
-            <a:r>
-              <a:rPr lang="en-US" sz="4400" b="1" dirty="0" smtClean="0">
-                <a:solidFill>
-                  <a:schemeClr val="tx1"/>
-                </a:solidFill>
-                <a:effectLst>
-                  <a:outerShdw blurRad="38100" dist="38100" dir="2700000" algn="tl">
-                    <a:srgbClr val="000000">
-                      <a:alpha val="43137"/>
-                    </a:srgbClr>
-                  </a:outerShdw>
-                </a:effectLst>
-                <a:latin typeface="B Nazanin+ Regular" panose="01000506000000020004" pitchFamily="2" charset="-78"/>
-                <a:cs typeface="B Nazanin+ Regular" panose="01000506000000020004" pitchFamily="2" charset="-78"/>
-              </a:rPr>
-              <a:t>Secure Layer = HTTPS</a:t>
+              <a:t>HTTP + Secure Layer = HTTPS</a:t>
             </a:r>
             <a:endParaRPr lang="fa-IR" sz="4400" b="1" dirty="0" smtClean="0">
               <a:solidFill>
@@ -8552,43 +8462,8 @@
                 <a:latin typeface="B Nazanin+ Regular" panose="01000506000000020004" pitchFamily="2" charset="-78"/>
                 <a:cs typeface="B Nazanin+ Regular" panose="01000506000000020004" pitchFamily="2" charset="-78"/>
               </a:rPr>
-              <a:t> </a:t>
-            </a:r>
-            <a:r>
-              <a:rPr lang="fa-IR" sz="4000" b="1" dirty="0" smtClean="0">
-                <a:solidFill>
-                  <a:schemeClr val="accent1">
-                    <a:lumMod val="75000"/>
-                  </a:schemeClr>
-                </a:solidFill>
-                <a:effectLst>
-                  <a:outerShdw blurRad="38100" dist="38100" dir="2700000" algn="tl">
-                    <a:srgbClr val="000000">
-                      <a:alpha val="43137"/>
-                    </a:srgbClr>
-                  </a:outerShdw>
-                </a:effectLst>
-                <a:latin typeface="B Nazanin+ Regular" panose="01000506000000020004" pitchFamily="2" charset="-78"/>
-                <a:cs typeface="B Nazanin+ Regular" panose="01000506000000020004" pitchFamily="2" charset="-78"/>
-              </a:rPr>
-              <a:t>رمز گذاری</a:t>
-            </a:r>
-            <a:endParaRPr lang="fa-IR" sz="4000" b="1" dirty="0" smtClean="0">
-              <a:solidFill>
-                <a:schemeClr val="accent1">
-                  <a:lumMod val="75000"/>
-                </a:schemeClr>
-              </a:solidFill>
-              <a:effectLst>
-                <a:outerShdw blurRad="38100" dist="38100" dir="2700000" algn="tl">
-                  <a:srgbClr val="000000">
-                    <a:alpha val="43137"/>
-                  </a:srgbClr>
-                </a:outerShdw>
-              </a:effectLst>
-              <a:latin typeface="B Nazanin+ Regular" panose="01000506000000020004" pitchFamily="2" charset="-78"/>
-              <a:cs typeface="B Nazanin+ Regular" panose="01000506000000020004" pitchFamily="2" charset="-78"/>
-            </a:endParaRPr>
+              <a:t> رمز گذاری</a:t>
+            </a:r>
           </a:p>
           <a:p>
             <a:pPr algn="r" rtl="1">
@@ -8615,26 +8490,7 @@
                 <a:latin typeface="B Nazanin+ Regular" panose="01000506000000020004" pitchFamily="2" charset="-78"/>
                 <a:cs typeface="B Nazanin+ Regular" panose="01000506000000020004" pitchFamily="2" charset="-78"/>
               </a:rPr>
-              <a:t>  </a:t>
-            </a:r>
-            <a:r>
-              <a:rPr lang="fa-IR" sz="4000" b="1" dirty="0" smtClean="0">
-                <a:solidFill>
-                  <a:schemeClr val="accent1">
-                    <a:lumMod val="75000"/>
-                  </a:schemeClr>
-                </a:solidFill>
-                <a:effectLst>
-                  <a:outerShdw blurRad="38100" dist="38100" dir="2700000" algn="tl">
-                    <a:srgbClr val="000000">
-                      <a:alpha val="43137"/>
-                    </a:srgbClr>
-                  </a:outerShdw>
-                </a:effectLst>
-                <a:latin typeface="B Nazanin+ Regular" panose="01000506000000020004" pitchFamily="2" charset="-78"/>
-                <a:cs typeface="B Nazanin+ Regular" panose="01000506000000020004" pitchFamily="2" charset="-78"/>
-              </a:rPr>
-              <a:t>نتیجه گیری </a:t>
+              <a:t>  نتیجه گیری </a:t>
             </a:r>
             <a:endParaRPr lang="en-US" sz="4000" b="1" dirty="0" smtClean="0">
               <a:solidFill>
@@ -8678,26 +8534,7 @@
                 <a:latin typeface="B Nazanin+ Regular" panose="01000506000000020004" pitchFamily="2" charset="-78"/>
                 <a:cs typeface="B Nazanin+ Regular" panose="01000506000000020004" pitchFamily="2" charset="-78"/>
               </a:rPr>
-              <a:t> </a:t>
-            </a:r>
-            <a:r>
-              <a:rPr lang="fa-IR" sz="4000" b="1" dirty="0" smtClean="0">
-                <a:solidFill>
-                  <a:schemeClr val="accent1">
-                    <a:lumMod val="75000"/>
-                  </a:schemeClr>
-                </a:solidFill>
-                <a:effectLst>
-                  <a:outerShdw blurRad="38100" dist="38100" dir="2700000" algn="tl">
-                    <a:srgbClr val="000000">
-                      <a:alpha val="43137"/>
-                    </a:srgbClr>
-                  </a:outerShdw>
-                </a:effectLst>
-                <a:latin typeface="B Nazanin+ Regular" panose="01000506000000020004" pitchFamily="2" charset="-78"/>
-                <a:cs typeface="B Nazanin+ Regular" panose="01000506000000020004" pitchFamily="2" charset="-78"/>
-              </a:rPr>
-              <a:t> مراجع </a:t>
+              <a:t>  مراجع </a:t>
             </a:r>
             <a:endParaRPr lang="en-US" sz="4000" b="1" dirty="0">
               <a:solidFill>
@@ -9010,41 +8847,7 @@
                 <a:latin typeface="B Nazanin+ Regular" panose="01000506000000020004" pitchFamily="2" charset="-78"/>
                 <a:cs typeface="B Nazanin+ Regular" panose="01000506000000020004" pitchFamily="2" charset="-78"/>
               </a:rPr>
-              <a:t> </a:t>
-            </a:r>
-            <a:r>
-              <a:rPr lang="fa-IR" sz="4400" b="1" dirty="0" smtClean="0">
-                <a:solidFill>
-                  <a:schemeClr val="tx1"/>
-                </a:solidFill>
-                <a:effectLst>
-                  <a:outerShdw blurRad="38100" dist="38100" dir="2700000" algn="tl">
-                    <a:srgbClr val="000000">
-                      <a:alpha val="43137"/>
-                    </a:srgbClr>
-                  </a:outerShdw>
-                </a:effectLst>
-                <a:latin typeface="B Nazanin+ Regular" panose="01000506000000020004" pitchFamily="2" charset="-78"/>
-                <a:cs typeface="B Nazanin+ Regular" panose="01000506000000020004" pitchFamily="2" charset="-78"/>
-              </a:rPr>
-              <a:t>طراحی </a:t>
-            </a:r>
-            <a:r>
-              <a:rPr lang="fa-IR" sz="4400" b="1" dirty="0" smtClean="0">
-                <a:solidFill>
-                  <a:schemeClr val="tx1"/>
-                </a:solidFill>
-                <a:effectLst>
-                  <a:outerShdw blurRad="38100" dist="38100" dir="2700000" algn="tl">
-                    <a:srgbClr val="000000">
-                      <a:alpha val="43137"/>
-                    </a:srgbClr>
-                  </a:outerShdw>
-                </a:effectLst>
-                <a:latin typeface="B Nazanin+ Regular" panose="01000506000000020004" pitchFamily="2" charset="-78"/>
-                <a:cs typeface="B Nazanin+ Regular" panose="01000506000000020004" pitchFamily="2" charset="-78"/>
-              </a:rPr>
-              <a:t>شده است . </a:t>
+              <a:t> طراحی شده است . </a:t>
             </a:r>
           </a:p>
           <a:p>
@@ -9147,24 +8950,7 @@
                 <a:latin typeface="B Nazanin+ Regular" panose="01000506000000020004" pitchFamily="2" charset="-78"/>
                 <a:cs typeface="B Nazanin+ Regular" panose="01000506000000020004" pitchFamily="2" charset="-78"/>
               </a:rPr>
-              <a:t> این </a:t>
-            </a:r>
-            <a:r>
-              <a:rPr lang="fa-IR" sz="4400" b="1" dirty="0" smtClean="0">
-                <a:solidFill>
-                  <a:schemeClr val="tx1"/>
-                </a:solidFill>
-                <a:effectLst>
-                  <a:outerShdw blurRad="38100" dist="38100" dir="2700000" algn="tl">
-                    <a:srgbClr val="000000">
-                      <a:alpha val="43137"/>
-                    </a:srgbClr>
-                  </a:outerShdw>
-                </a:effectLst>
-                <a:latin typeface="B Nazanin+ Regular" panose="01000506000000020004" pitchFamily="2" charset="-78"/>
-                <a:cs typeface="B Nazanin+ Regular" panose="01000506000000020004" pitchFamily="2" charset="-78"/>
-              </a:rPr>
-              <a:t>دو پروتکل در لایه امنیت هستند </a:t>
+              <a:t> این دو پروتکل در لایه امنیت هستند </a:t>
             </a:r>
             <a:r>
               <a:rPr lang="en-US" sz="4400" b="1" dirty="0" smtClean="0">
@@ -9207,39 +8993,8 @@
                 <a:latin typeface="B Nazanin+ Regular" panose="01000506000000020004" pitchFamily="2" charset="-78"/>
                 <a:cs typeface="B Nazanin+ Regular" panose="01000506000000020004" pitchFamily="2" charset="-78"/>
               </a:rPr>
-              <a:t> </a:t>
-            </a:r>
-            <a:r>
-              <a:rPr lang="fa-IR" sz="4400" b="1" dirty="0" smtClean="0">
-                <a:solidFill>
-                  <a:schemeClr val="tx1"/>
-                </a:solidFill>
-                <a:effectLst>
-                  <a:outerShdw blurRad="38100" dist="38100" dir="2700000" algn="tl">
-                    <a:srgbClr val="000000">
-                      <a:alpha val="43137"/>
-                    </a:srgbClr>
-                  </a:outerShdw>
-                </a:effectLst>
-                <a:latin typeface="B Nazanin+ Regular" panose="01000506000000020004" pitchFamily="2" charset="-78"/>
-                <a:cs typeface="B Nazanin+ Regular" panose="01000506000000020004" pitchFamily="2" charset="-78"/>
-              </a:rPr>
-              <a:t>اساس این دو پروتکل رمز گذاری اطلاعات است .</a:t>
-            </a:r>
-            <a:endParaRPr lang="fa-IR" sz="4400" b="1" dirty="0" smtClean="0">
-              <a:solidFill>
-                <a:schemeClr val="tx1"/>
-              </a:solidFill>
-              <a:effectLst>
-                <a:outerShdw blurRad="38100" dist="38100" dir="2700000" algn="tl">
-                  <a:srgbClr val="000000">
-                    <a:alpha val="43137"/>
-                  </a:srgbClr>
-                </a:outerShdw>
-              </a:effectLst>
-              <a:latin typeface="B Nazanin+ Regular" panose="01000506000000020004" pitchFamily="2" charset="-78"/>
-              <a:cs typeface="B Nazanin+ Regular" panose="01000506000000020004" pitchFamily="2" charset="-78"/>
-            </a:endParaRPr>
+              <a:t> اساس این دو پروتکل رمز گذاری اطلاعات است .</a:t>
+            </a:r>
           </a:p>
         </p:txBody>
       </p:sp>
@@ -9927,39 +9682,8 @@
                 <a:latin typeface="B Nazanin+ Regular" panose="01000506000000020004" pitchFamily="2" charset="-78"/>
                 <a:cs typeface="B Nazanin+ Regular" panose="01000506000000020004" pitchFamily="2" charset="-78"/>
               </a:rPr>
-              <a:t> </a:t>
-            </a:r>
-            <a:r>
-              <a:rPr lang="fa-IR" sz="4000" b="1" dirty="0" smtClean="0">
-                <a:solidFill>
-                  <a:schemeClr val="tx1"/>
-                </a:solidFill>
-                <a:effectLst>
-                  <a:outerShdw blurRad="38100" dist="38100" dir="2700000" algn="tl">
-                    <a:srgbClr val="000000">
-                      <a:alpha val="43137"/>
-                    </a:srgbClr>
-                  </a:outerShdw>
-                </a:effectLst>
-                <a:latin typeface="B Nazanin+ Regular" panose="01000506000000020004" pitchFamily="2" charset="-78"/>
-                <a:cs typeface="B Nazanin+ Regular" panose="01000506000000020004" pitchFamily="2" charset="-78"/>
-              </a:rPr>
-              <a:t>رمز گذاری</a:t>
-            </a:r>
-            <a:endParaRPr lang="fa-IR" sz="4000" b="1" dirty="0" smtClean="0">
-              <a:solidFill>
-                <a:schemeClr val="tx1"/>
-              </a:solidFill>
-              <a:effectLst>
-                <a:outerShdw blurRad="38100" dist="38100" dir="2700000" algn="tl">
-                  <a:srgbClr val="000000">
-                    <a:alpha val="43137"/>
-                  </a:srgbClr>
-                </a:outerShdw>
-              </a:effectLst>
-              <a:latin typeface="B Nazanin+ Regular" panose="01000506000000020004" pitchFamily="2" charset="-78"/>
-              <a:cs typeface="B Nazanin+ Regular" panose="01000506000000020004" pitchFamily="2" charset="-78"/>
-            </a:endParaRPr>
+              <a:t> رمز گذاری</a:t>
+            </a:r>
           </a:p>
           <a:p>
             <a:pPr algn="r" rtl="1">
@@ -9986,26 +9710,7 @@
                 <a:latin typeface="B Nazanin+ Regular" panose="01000506000000020004" pitchFamily="2" charset="-78"/>
                 <a:cs typeface="B Nazanin+ Regular" panose="01000506000000020004" pitchFamily="2" charset="-78"/>
               </a:rPr>
-              <a:t>  </a:t>
-            </a:r>
-            <a:r>
-              <a:rPr lang="fa-IR" sz="4000" b="1" dirty="0" smtClean="0">
-                <a:solidFill>
-                  <a:schemeClr val="accent1">
-                    <a:lumMod val="75000"/>
-                  </a:schemeClr>
-                </a:solidFill>
-                <a:effectLst>
-                  <a:outerShdw blurRad="38100" dist="38100" dir="2700000" algn="tl">
-                    <a:srgbClr val="000000">
-                      <a:alpha val="43137"/>
-                    </a:srgbClr>
-                  </a:outerShdw>
-                </a:effectLst>
-                <a:latin typeface="B Nazanin+ Regular" panose="01000506000000020004" pitchFamily="2" charset="-78"/>
-                <a:cs typeface="B Nazanin+ Regular" panose="01000506000000020004" pitchFamily="2" charset="-78"/>
-              </a:rPr>
-              <a:t>نتیجه گیری </a:t>
+              <a:t>  نتیجه گیری </a:t>
             </a:r>
             <a:endParaRPr lang="en-US" sz="4000" b="1" dirty="0" smtClean="0">
               <a:solidFill>
@@ -10049,26 +9754,7 @@
                 <a:latin typeface="B Nazanin+ Regular" panose="01000506000000020004" pitchFamily="2" charset="-78"/>
                 <a:cs typeface="B Nazanin+ Regular" panose="01000506000000020004" pitchFamily="2" charset="-78"/>
               </a:rPr>
-              <a:t> </a:t>
-            </a:r>
-            <a:r>
-              <a:rPr lang="fa-IR" sz="4000" b="1" dirty="0" smtClean="0">
-                <a:solidFill>
-                  <a:schemeClr val="accent1">
-                    <a:lumMod val="75000"/>
-                  </a:schemeClr>
-                </a:solidFill>
-                <a:effectLst>
-                  <a:outerShdw blurRad="38100" dist="38100" dir="2700000" algn="tl">
-                    <a:srgbClr val="000000">
-                      <a:alpha val="43137"/>
-                    </a:srgbClr>
-                  </a:outerShdw>
-                </a:effectLst>
-                <a:latin typeface="B Nazanin+ Regular" panose="01000506000000020004" pitchFamily="2" charset="-78"/>
-                <a:cs typeface="B Nazanin+ Regular" panose="01000506000000020004" pitchFamily="2" charset="-78"/>
-              </a:rPr>
-              <a:t> مراجع </a:t>
+              <a:t>  مراجع </a:t>
             </a:r>
             <a:endParaRPr lang="en-US" sz="4000" b="1" dirty="0">
               <a:solidFill>
@@ -10174,7 +9860,26 @@
                 <a:latin typeface="B Nazanin+ Regular" panose="01000506000000020004" pitchFamily="2" charset="-78"/>
                 <a:cs typeface="B Nazanin+ Regular" panose="01000506000000020004" pitchFamily="2" charset="-78"/>
               </a:rPr>
-              <a:t>کد گذاری اطلاعات </a:t>
+              <a:t>رمزگذاری </a:t>
+            </a:r>
+            <a:r>
+              <a:rPr lang="fa-IR" sz="6000" b="1" dirty="0" smtClean="0">
+                <a:solidFill>
+                  <a:schemeClr val="accent6">
+                    <a:lumMod val="75000"/>
+                  </a:schemeClr>
+                </a:solidFill>
+                <a:effectLst>
+                  <a:outerShdw blurRad="38100" dist="38100" dir="2700000" algn="tl">
+                    <a:srgbClr val="000000">
+                      <a:alpha val="43137"/>
+                    </a:srgbClr>
+                  </a:outerShdw>
+                </a:effectLst>
+                <a:latin typeface="B Nazanin+ Regular" panose="01000506000000020004" pitchFamily="2" charset="-78"/>
+                <a:cs typeface="B Nazanin+ Regular" panose="01000506000000020004" pitchFamily="2" charset="-78"/>
+              </a:rPr>
+              <a:t>اطلاعات </a:t>
             </a:r>
             <a:endParaRPr lang="en-US" sz="6000" b="1" dirty="0">
               <a:solidFill>
@@ -10875,39 +10580,8 @@
                 <a:latin typeface="B Nazanin+ Regular" panose="01000506000000020004" pitchFamily="2" charset="-78"/>
                 <a:cs typeface="B Nazanin+ Regular" panose="01000506000000020004" pitchFamily="2" charset="-78"/>
               </a:rPr>
-              <a:t> در ابتدا الگوریتم های کد گذاری بسیار ساده </a:t>
-            </a:r>
-            <a:r>
-              <a:rPr lang="fa-IR" sz="4400" b="1" dirty="0" smtClean="0">
-                <a:solidFill>
-                  <a:schemeClr val="tx1"/>
-                </a:solidFill>
-                <a:effectLst>
-                  <a:outerShdw blurRad="38100" dist="38100" dir="2700000" algn="tl">
-                    <a:srgbClr val="000000">
-                      <a:alpha val="43137"/>
-                    </a:srgbClr>
-                  </a:outerShdw>
-                </a:effectLst>
-                <a:latin typeface="B Nazanin+ Regular" panose="01000506000000020004" pitchFamily="2" charset="-78"/>
-                <a:cs typeface="B Nazanin+ Regular" panose="01000506000000020004" pitchFamily="2" charset="-78"/>
-              </a:rPr>
-              <a:t>بودند .</a:t>
-            </a:r>
-            <a:endParaRPr lang="fa-IR" sz="4400" b="1" dirty="0" smtClean="0">
-              <a:solidFill>
-                <a:schemeClr val="tx1"/>
-              </a:solidFill>
-              <a:effectLst>
-                <a:outerShdw blurRad="38100" dist="38100" dir="2700000" algn="tl">
-                  <a:srgbClr val="000000">
-                    <a:alpha val="43137"/>
-                  </a:srgbClr>
-                </a:outerShdw>
-              </a:effectLst>
-              <a:latin typeface="B Nazanin+ Regular" panose="01000506000000020004" pitchFamily="2" charset="-78"/>
-              <a:cs typeface="B Nazanin+ Regular" panose="01000506000000020004" pitchFamily="2" charset="-78"/>
-            </a:endParaRPr>
+              <a:t> در ابتدا الگوریتم های کد گذاری بسیار ساده بودند .</a:t>
+            </a:r>
           </a:p>
           <a:p>
             <a:pPr algn="r" rtl="1">
@@ -10949,73 +10623,8 @@
                 <a:latin typeface="B Nazanin+ Regular" panose="01000506000000020004" pitchFamily="2" charset="-78"/>
                 <a:cs typeface="B Nazanin+ Regular" panose="01000506000000020004" pitchFamily="2" charset="-78"/>
               </a:rPr>
-              <a:t>عمل </a:t>
-            </a:r>
-            <a:r>
-              <a:rPr lang="fa-IR" sz="4400" b="1" dirty="0" smtClean="0">
-                <a:solidFill>
-                  <a:schemeClr val="tx1"/>
-                </a:solidFill>
-                <a:effectLst>
-                  <a:outerShdw blurRad="38100" dist="38100" dir="2700000" algn="tl">
-                    <a:srgbClr val="000000">
-                      <a:alpha val="43137"/>
-                    </a:srgbClr>
-                  </a:outerShdw>
-                </a:effectLst>
-                <a:latin typeface="B Nazanin+ Regular" panose="01000506000000020004" pitchFamily="2" charset="-78"/>
-                <a:cs typeface="B Nazanin+ Regular" panose="01000506000000020004" pitchFamily="2" charset="-78"/>
-              </a:rPr>
-              <a:t>رمزگذاری </a:t>
-            </a:r>
-            <a:r>
-              <a:rPr lang="fa-IR" sz="4400" b="1" dirty="0" smtClean="0">
-                <a:solidFill>
-                  <a:schemeClr val="tx1"/>
-                </a:solidFill>
-                <a:effectLst>
-                  <a:outerShdw blurRad="38100" dist="38100" dir="2700000" algn="tl">
-                    <a:srgbClr val="000000">
-                      <a:alpha val="43137"/>
-                    </a:srgbClr>
-                  </a:outerShdw>
-                </a:effectLst>
-                <a:latin typeface="B Nazanin+ Regular" panose="01000506000000020004" pitchFamily="2" charset="-78"/>
-                <a:cs typeface="B Nazanin+ Regular" panose="01000506000000020004" pitchFamily="2" charset="-78"/>
-              </a:rPr>
-              <a:t>و </a:t>
-            </a:r>
-            <a:r>
-              <a:rPr lang="fa-IR" sz="4400" b="1" dirty="0" smtClean="0">
-                <a:solidFill>
-                  <a:schemeClr val="tx1"/>
-                </a:solidFill>
-                <a:effectLst>
-                  <a:outerShdw blurRad="38100" dist="38100" dir="2700000" algn="tl">
-                    <a:srgbClr val="000000">
-                      <a:alpha val="43137"/>
-                    </a:srgbClr>
-                  </a:outerShdw>
-                </a:effectLst>
-                <a:latin typeface="B Nazanin+ Regular" panose="01000506000000020004" pitchFamily="2" charset="-78"/>
-                <a:cs typeface="B Nazanin+ Regular" panose="01000506000000020004" pitchFamily="2" charset="-78"/>
-              </a:rPr>
-              <a:t>رمزگشائی را انسان انجام می داد .</a:t>
-            </a:r>
-            <a:endParaRPr lang="fa-IR" sz="4400" b="1" dirty="0" smtClean="0">
-              <a:solidFill>
-                <a:schemeClr val="tx1"/>
-              </a:solidFill>
-              <a:effectLst>
-                <a:outerShdw blurRad="38100" dist="38100" dir="2700000" algn="tl">
-                  <a:srgbClr val="000000">
-                    <a:alpha val="43137"/>
-                  </a:srgbClr>
-                </a:outerShdw>
-              </a:effectLst>
-              <a:latin typeface="B Nazanin+ Regular" panose="01000506000000020004" pitchFamily="2" charset="-78"/>
-              <a:cs typeface="B Nazanin+ Regular" panose="01000506000000020004" pitchFamily="2" charset="-78"/>
-            </a:endParaRPr>
+              <a:t>عمل رمزگذاری و رمزگشائی را انسان انجام می داد .</a:t>
+            </a:r>
           </a:p>
           <a:p>
             <a:pPr algn="r" rtl="1">
@@ -11040,41 +10649,7 @@
                 <a:latin typeface="B Nazanin+ Regular" panose="01000506000000020004" pitchFamily="2" charset="-78"/>
                 <a:cs typeface="B Nazanin+ Regular" panose="01000506000000020004" pitchFamily="2" charset="-78"/>
               </a:rPr>
-              <a:t> از کاغذ و قلم و کتاب های کدگذاری استفاده می </a:t>
-            </a:r>
-            <a:r>
-              <a:rPr lang="fa-IR" sz="4400" b="1" dirty="0" smtClean="0">
-                <a:solidFill>
-                  <a:schemeClr val="tx1"/>
-                </a:solidFill>
-                <a:effectLst>
-                  <a:outerShdw blurRad="38100" dist="38100" dir="2700000" algn="tl">
-                    <a:srgbClr val="000000">
-                      <a:alpha val="43137"/>
-                    </a:srgbClr>
-                  </a:outerShdw>
-                </a:effectLst>
-                <a:latin typeface="B Nazanin+ Regular" panose="01000506000000020004" pitchFamily="2" charset="-78"/>
-                <a:cs typeface="B Nazanin+ Regular" panose="01000506000000020004" pitchFamily="2" charset="-78"/>
-              </a:rPr>
-              <a:t>شد </a:t>
-            </a:r>
-            <a:r>
-              <a:rPr lang="fa-IR" sz="4400" b="1" dirty="0" smtClean="0">
-                <a:solidFill>
-                  <a:schemeClr val="tx1"/>
-                </a:solidFill>
-                <a:effectLst>
-                  <a:outerShdw blurRad="38100" dist="38100" dir="2700000" algn="tl">
-                    <a:srgbClr val="000000">
-                      <a:alpha val="43137"/>
-                    </a:srgbClr>
-                  </a:outerShdw>
-                </a:effectLst>
-                <a:latin typeface="B Nazanin+ Regular" panose="01000506000000020004" pitchFamily="2" charset="-78"/>
-                <a:cs typeface="B Nazanin+ Regular" panose="01000506000000020004" pitchFamily="2" charset="-78"/>
-              </a:rPr>
-              <a:t>.</a:t>
+              <a:t> از کاغذ و قلم و کتاب های کدگذاری استفاده می شد .</a:t>
             </a:r>
           </a:p>
           <a:p>
@@ -11421,26 +10996,7 @@
                 <a:latin typeface="B Nazanin+ Regular" panose="01000506000000020004" pitchFamily="2" charset="-78"/>
                 <a:cs typeface="B Nazanin+ Regular" panose="01000506000000020004" pitchFamily="2" charset="-78"/>
               </a:rPr>
-              <a:t>رایانه </a:t>
-            </a:r>
-            <a:r>
-              <a:rPr lang="fa-IR" sz="6000" b="1" dirty="0" smtClean="0">
-                <a:solidFill>
-                  <a:schemeClr val="accent6">
-                    <a:lumMod val="75000"/>
-                  </a:schemeClr>
-                </a:solidFill>
-                <a:effectLst>
-                  <a:outerShdw blurRad="38100" dist="38100" dir="2700000" algn="tl">
-                    <a:srgbClr val="000000">
-                      <a:alpha val="43137"/>
-                    </a:srgbClr>
-                  </a:outerShdw>
-                </a:effectLst>
-                <a:latin typeface="B Nazanin+ Regular" panose="01000506000000020004" pitchFamily="2" charset="-78"/>
-                <a:cs typeface="B Nazanin+ Regular" panose="01000506000000020004" pitchFamily="2" charset="-78"/>
-              </a:rPr>
-              <a:t>ها _ رشد الگوریتم های کد گذاری </a:t>
+              <a:t>رایانه ها _ رشد الگوریتم های کد گذاری </a:t>
             </a:r>
             <a:endParaRPr lang="en-US" sz="6000" b="1" dirty="0">
               <a:solidFill>
@@ -11502,24 +11058,7 @@
                 <a:latin typeface="B Nazanin+ Regular" panose="01000506000000020004" pitchFamily="2" charset="-78"/>
                 <a:cs typeface="B Nazanin+ Regular" panose="01000506000000020004" pitchFamily="2" charset="-78"/>
               </a:rPr>
-              <a:t> با پدید آمدن رایانه </a:t>
-            </a:r>
-            <a:r>
-              <a:rPr lang="fa-IR" sz="4400" b="1" dirty="0" smtClean="0">
-                <a:solidFill>
-                  <a:schemeClr val="tx1"/>
-                </a:solidFill>
-                <a:effectLst>
-                  <a:outerShdw blurRad="38100" dist="38100" dir="2700000" algn="tl">
-                    <a:srgbClr val="000000">
-                      <a:alpha val="43137"/>
-                    </a:srgbClr>
-                  </a:outerShdw>
-                </a:effectLst>
-                <a:latin typeface="B Nazanin+ Regular" panose="01000506000000020004" pitchFamily="2" charset="-78"/>
-                <a:cs typeface="B Nazanin+ Regular" panose="01000506000000020004" pitchFamily="2" charset="-78"/>
-              </a:rPr>
-              <a:t>ها، کدگذاری توسط ماشین ها انجام می شد .</a:t>
+              <a:t> با پدید آمدن رایانه ها، کدگذاری توسط ماشین ها انجام می شد .</a:t>
             </a:r>
           </a:p>
           <a:p>
@@ -11545,24 +11084,7 @@
                 <a:latin typeface="B Nazanin+ Regular" panose="01000506000000020004" pitchFamily="2" charset="-78"/>
                 <a:cs typeface="B Nazanin+ Regular" panose="01000506000000020004" pitchFamily="2" charset="-78"/>
               </a:rPr>
-              <a:t>مزیت </a:t>
-            </a:r>
-            <a:r>
-              <a:rPr lang="fa-IR" sz="4400" b="1" dirty="0" smtClean="0">
-                <a:solidFill>
-                  <a:schemeClr val="tx1"/>
-                </a:solidFill>
-                <a:effectLst>
-                  <a:outerShdw blurRad="38100" dist="38100" dir="2700000" algn="tl">
-                    <a:srgbClr val="000000">
-                      <a:alpha val="43137"/>
-                    </a:srgbClr>
-                  </a:outerShdw>
-                </a:effectLst>
-                <a:latin typeface="B Nazanin+ Regular" panose="01000506000000020004" pitchFamily="2" charset="-78"/>
-                <a:cs typeface="B Nazanin+ Regular" panose="01000506000000020004" pitchFamily="2" charset="-78"/>
-              </a:rPr>
-              <a:t>ها : </a:t>
+              <a:t>مزیت ها : </a:t>
             </a:r>
           </a:p>
           <a:p>
@@ -11665,39 +11187,8 @@
                 <a:latin typeface="B Nazanin+ Regular" panose="01000506000000020004" pitchFamily="2" charset="-78"/>
                 <a:cs typeface="B Nazanin+ Regular" panose="01000506000000020004" pitchFamily="2" charset="-78"/>
               </a:rPr>
-              <a:t>سرعت بیشتر : حجم اطلاعاتی بیشتری مورد پردازش قرار می گرفت </a:t>
-            </a:r>
-            <a:r>
-              <a:rPr lang="fa-IR" sz="4400" b="1" dirty="0" smtClean="0">
-                <a:solidFill>
-                  <a:schemeClr val="tx1"/>
-                </a:solidFill>
-                <a:effectLst>
-                  <a:outerShdw blurRad="38100" dist="38100" dir="2700000" algn="tl">
-                    <a:srgbClr val="000000">
-                      <a:alpha val="43137"/>
-                    </a:srgbClr>
-                  </a:outerShdw>
-                </a:effectLst>
-                <a:latin typeface="B Nazanin+ Regular" panose="01000506000000020004" pitchFamily="2" charset="-78"/>
-                <a:cs typeface="B Nazanin+ Regular" panose="01000506000000020004" pitchFamily="2" charset="-78"/>
-              </a:rPr>
-              <a:t>.</a:t>
-            </a:r>
-            <a:endParaRPr lang="fa-IR" sz="4400" b="1" dirty="0" smtClean="0">
-              <a:solidFill>
-                <a:schemeClr val="tx1"/>
-              </a:solidFill>
-              <a:effectLst>
-                <a:outerShdw blurRad="38100" dist="38100" dir="2700000" algn="tl">
-                  <a:srgbClr val="000000">
-                    <a:alpha val="43137"/>
-                  </a:srgbClr>
-                </a:outerShdw>
-              </a:effectLst>
-              <a:latin typeface="B Nazanin+ Regular" panose="01000506000000020004" pitchFamily="2" charset="-78"/>
-              <a:cs typeface="B Nazanin+ Regular" panose="01000506000000020004" pitchFamily="2" charset="-78"/>
-            </a:endParaRPr>
+              <a:t>سرعت بیشتر : حجم اطلاعاتی بیشتری مورد پردازش قرار می گرفت .</a:t>
+            </a:r>
           </a:p>
           <a:p>
             <a:pPr marL="457200" lvl="1" indent="0" algn="r" rtl="1">
@@ -12014,26 +11505,7 @@
                 <a:latin typeface="B Nazanin+ Regular" panose="01000506000000020004" pitchFamily="2" charset="-78"/>
                 <a:cs typeface="B Nazanin+ Regular" panose="01000506000000020004" pitchFamily="2" charset="-78"/>
               </a:rPr>
-              <a:t>کد </a:t>
-            </a:r>
-            <a:r>
-              <a:rPr lang="fa-IR" sz="6000" b="1" dirty="0" smtClean="0">
-                <a:solidFill>
-                  <a:schemeClr val="accent6">
-                    <a:lumMod val="75000"/>
-                  </a:schemeClr>
-                </a:solidFill>
-                <a:effectLst>
-                  <a:outerShdw blurRad="38100" dist="38100" dir="2700000" algn="tl">
-                    <a:srgbClr val="000000">
-                      <a:alpha val="43137"/>
-                    </a:srgbClr>
-                  </a:outerShdw>
-                </a:effectLst>
-                <a:latin typeface="B Nazanin+ Regular" panose="01000506000000020004" pitchFamily="2" charset="-78"/>
-                <a:cs typeface="B Nazanin+ Regular" panose="01000506000000020004" pitchFamily="2" charset="-78"/>
-              </a:rPr>
-              <a:t>گذاری بر اساس کلید</a:t>
+              <a:t>کد گذاری بر اساس کلید</a:t>
             </a:r>
             <a:endParaRPr lang="en-US" sz="6000" b="1" dirty="0">
               <a:solidFill>
@@ -12098,56 +11570,8 @@
                 <a:latin typeface="B Nazanin+ Regular" panose="01000506000000020004" pitchFamily="2" charset="-78"/>
                 <a:cs typeface="B Nazanin+ Regular" panose="01000506000000020004" pitchFamily="2" charset="-78"/>
               </a:rPr>
-              <a:t> ممکن </a:t>
-            </a:r>
-            <a:r>
-              <a:rPr lang="fa-IR" sz="4400" b="1" dirty="0" smtClean="0">
-                <a:solidFill>
-                  <a:schemeClr val="tx1"/>
-                </a:solidFill>
-                <a:effectLst>
-                  <a:outerShdw blurRad="38100" dist="38100" dir="2700000" algn="tl">
-                    <a:srgbClr val="000000">
-                      <a:alpha val="43137"/>
-                    </a:srgbClr>
-                  </a:outerShdw>
-                </a:effectLst>
-                <a:latin typeface="B Nazanin+ Regular" panose="01000506000000020004" pitchFamily="2" charset="-78"/>
-                <a:cs typeface="B Nazanin+ Regular" panose="01000506000000020004" pitchFamily="2" charset="-78"/>
-              </a:rPr>
-              <a:t>بود الگوریتم های کد گذاری به دست دشمن </a:t>
-            </a:r>
-            <a:r>
-              <a:rPr lang="fa-IR" sz="4400" b="1" dirty="0" smtClean="0">
-                <a:solidFill>
-                  <a:schemeClr val="tx1"/>
-                </a:solidFill>
-                <a:effectLst>
-                  <a:outerShdw blurRad="38100" dist="38100" dir="2700000" algn="tl">
-                    <a:srgbClr val="000000">
-                      <a:alpha val="43137"/>
-                    </a:srgbClr>
-                  </a:outerShdw>
-                </a:effectLst>
-                <a:latin typeface="B Nazanin+ Regular" panose="01000506000000020004" pitchFamily="2" charset="-78"/>
-                <a:cs typeface="B Nazanin+ Regular" panose="01000506000000020004" pitchFamily="2" charset="-78"/>
-              </a:rPr>
-              <a:t>بیفتد . </a:t>
-            </a:r>
-            <a:endParaRPr lang="fa-IR" sz="4400" b="1" dirty="0" smtClean="0">
-              <a:solidFill>
-                <a:schemeClr val="tx1"/>
-              </a:solidFill>
-              <a:effectLst>
-                <a:outerShdw blurRad="38100" dist="38100" dir="2700000" algn="tl">
-                  <a:srgbClr val="000000">
-                    <a:alpha val="43137"/>
-                  </a:srgbClr>
-                </a:outerShdw>
-              </a:effectLst>
-              <a:latin typeface="B Nazanin+ Regular" panose="01000506000000020004" pitchFamily="2" charset="-78"/>
-              <a:cs typeface="B Nazanin+ Regular" panose="01000506000000020004" pitchFamily="2" charset="-78"/>
-            </a:endParaRPr>
+              <a:t> ممکن بود الگوریتم های کد گذاری به دست دشمن بیفتد . </a:t>
+            </a:r>
           </a:p>
           <a:p>
             <a:pPr algn="r" rtl="1">
@@ -12209,24 +11633,7 @@
                 <a:latin typeface="B Nazanin+ Regular" panose="01000506000000020004" pitchFamily="2" charset="-78"/>
                 <a:cs typeface="B Nazanin+ Regular" panose="01000506000000020004" pitchFamily="2" charset="-78"/>
               </a:rPr>
-              <a:t> الگوریتم </a:t>
-            </a:r>
-            <a:r>
-              <a:rPr lang="fa-IR" sz="4400" b="1" dirty="0" smtClean="0">
-                <a:solidFill>
-                  <a:schemeClr val="tx1"/>
-                </a:solidFill>
-                <a:effectLst>
-                  <a:outerShdw blurRad="38100" dist="38100" dir="2700000" algn="tl">
-                    <a:srgbClr val="000000">
-                      <a:alpha val="43137"/>
-                    </a:srgbClr>
-                  </a:outerShdw>
-                </a:effectLst>
-                <a:latin typeface="B Nazanin+ Regular" panose="01000506000000020004" pitchFamily="2" charset="-78"/>
-                <a:cs typeface="B Nazanin+ Regular" panose="01000506000000020004" pitchFamily="2" charset="-78"/>
-              </a:rPr>
-              <a:t>کد گذاری در دسترس عموم است .</a:t>
+              <a:t> الگوریتم کد گذاری در دسترس عموم است .</a:t>
             </a:r>
           </a:p>
           <a:p>
@@ -12251,20 +11658,6 @@
               </a:rPr>
               <a:t> برای کد گذاری نیاز به یک کلید داریم .</a:t>
             </a:r>
-            <a:endParaRPr lang="fa-IR" sz="4400" b="1" dirty="0" smtClean="0">
-              <a:solidFill>
-                <a:schemeClr val="tx1"/>
-              </a:solidFill>
-              <a:effectLst>
-                <a:outerShdw blurRad="38100" dist="38100" dir="2700000" algn="tl">
-                  <a:srgbClr val="000000">
-                    <a:alpha val="43137"/>
-                  </a:srgbClr>
-                </a:outerShdw>
-              </a:effectLst>
-              <a:latin typeface="B Nazanin+ Regular" panose="01000506000000020004" pitchFamily="2" charset="-78"/>
-              <a:cs typeface="B Nazanin+ Regular" panose="01000506000000020004" pitchFamily="2" charset="-78"/>
-            </a:endParaRPr>
           </a:p>
           <a:p>
             <a:pPr algn="r" rtl="1">
@@ -12289,41 +11682,7 @@
                 <a:latin typeface="B Nazanin+ Regular" panose="01000506000000020004" pitchFamily="2" charset="-78"/>
                 <a:cs typeface="B Nazanin+ Regular" panose="01000506000000020004" pitchFamily="2" charset="-78"/>
               </a:rPr>
-              <a:t>خروجی به ازای هر کلید، </a:t>
-            </a:r>
-            <a:r>
-              <a:rPr lang="fa-IR" sz="4400" b="1" dirty="0" smtClean="0">
-                <a:solidFill>
-                  <a:schemeClr val="tx1"/>
-                </a:solidFill>
-                <a:effectLst>
-                  <a:outerShdw blurRad="38100" dist="38100" dir="2700000" algn="tl">
-                    <a:srgbClr val="000000">
-                      <a:alpha val="43137"/>
-                    </a:srgbClr>
-                  </a:outerShdw>
-                </a:effectLst>
-                <a:latin typeface="B Nazanin+ Regular" panose="01000506000000020004" pitchFamily="2" charset="-78"/>
-                <a:cs typeface="B Nazanin+ Regular" panose="01000506000000020004" pitchFamily="2" charset="-78"/>
-              </a:rPr>
-              <a:t>با خروجی های دیگر </a:t>
-            </a:r>
-            <a:r>
-              <a:rPr lang="fa-IR" sz="4400" b="1" dirty="0" smtClean="0">
-                <a:solidFill>
-                  <a:schemeClr val="tx1"/>
-                </a:solidFill>
-                <a:effectLst>
-                  <a:outerShdw blurRad="38100" dist="38100" dir="2700000" algn="tl">
-                    <a:srgbClr val="000000">
-                      <a:alpha val="43137"/>
-                    </a:srgbClr>
-                  </a:outerShdw>
-                </a:effectLst>
-                <a:latin typeface="B Nazanin+ Regular" panose="01000506000000020004" pitchFamily="2" charset="-78"/>
-                <a:cs typeface="B Nazanin+ Regular" panose="01000506000000020004" pitchFamily="2" charset="-78"/>
-              </a:rPr>
-              <a:t>تفاوت دارد . 	</a:t>
+              <a:t>خروجی به ازای هر کلید، با خروجی های دیگر تفاوت دارد . 	</a:t>
             </a:r>
           </a:p>
         </p:txBody>
@@ -13002,39 +12361,8 @@
                 <a:latin typeface="B Nazanin+ Regular" panose="01000506000000020004" pitchFamily="2" charset="-78"/>
                 <a:cs typeface="B Nazanin+ Regular" panose="01000506000000020004" pitchFamily="2" charset="-78"/>
               </a:rPr>
-              <a:t> </a:t>
-            </a:r>
-            <a:r>
-              <a:rPr lang="fa-IR" sz="4000" b="1" dirty="0" smtClean="0">
-                <a:solidFill>
-                  <a:schemeClr val="tx1"/>
-                </a:solidFill>
-                <a:effectLst>
-                  <a:outerShdw blurRad="38100" dist="38100" dir="2700000" algn="tl">
-                    <a:srgbClr val="000000">
-                      <a:alpha val="43137"/>
-                    </a:srgbClr>
-                  </a:outerShdw>
-                </a:effectLst>
-                <a:latin typeface="B Nazanin+ Regular" panose="01000506000000020004" pitchFamily="2" charset="-78"/>
-                <a:cs typeface="B Nazanin+ Regular" panose="01000506000000020004" pitchFamily="2" charset="-78"/>
-              </a:rPr>
-              <a:t>رمز گذاری</a:t>
-            </a:r>
-            <a:endParaRPr lang="fa-IR" sz="4000" b="1" dirty="0" smtClean="0">
-              <a:solidFill>
-                <a:schemeClr val="tx1"/>
-              </a:solidFill>
-              <a:effectLst>
-                <a:outerShdw blurRad="38100" dist="38100" dir="2700000" algn="tl">
-                  <a:srgbClr val="000000">
-                    <a:alpha val="43137"/>
-                  </a:srgbClr>
-                </a:outerShdw>
-              </a:effectLst>
-              <a:latin typeface="B Nazanin+ Regular" panose="01000506000000020004" pitchFamily="2" charset="-78"/>
-              <a:cs typeface="B Nazanin+ Regular" panose="01000506000000020004" pitchFamily="2" charset="-78"/>
-            </a:endParaRPr>
+              <a:t> رمز گذاری</a:t>
+            </a:r>
           </a:p>
           <a:p>
             <a:pPr algn="r" rtl="1">
@@ -13059,24 +12387,7 @@
                 <a:latin typeface="B Nazanin+ Regular" panose="01000506000000020004" pitchFamily="2" charset="-78"/>
                 <a:cs typeface="B Nazanin+ Regular" panose="01000506000000020004" pitchFamily="2" charset="-78"/>
               </a:rPr>
-              <a:t>  </a:t>
-            </a:r>
-            <a:r>
-              <a:rPr lang="fa-IR" sz="4000" b="1" dirty="0" smtClean="0">
-                <a:solidFill>
-                  <a:schemeClr val="tx1"/>
-                </a:solidFill>
-                <a:effectLst>
-                  <a:outerShdw blurRad="38100" dist="38100" dir="2700000" algn="tl">
-                    <a:srgbClr val="000000">
-                      <a:alpha val="43137"/>
-                    </a:srgbClr>
-                  </a:outerShdw>
-                </a:effectLst>
-                <a:latin typeface="B Nazanin+ Regular" panose="01000506000000020004" pitchFamily="2" charset="-78"/>
-                <a:cs typeface="B Nazanin+ Regular" panose="01000506000000020004" pitchFamily="2" charset="-78"/>
-              </a:rPr>
-              <a:t>نتیجه گیری </a:t>
+              <a:t>  نتیجه گیری </a:t>
             </a:r>
             <a:endParaRPr lang="en-US" sz="4000" b="1" dirty="0" smtClean="0">
               <a:solidFill>
@@ -13116,24 +12427,7 @@
                 <a:latin typeface="B Nazanin+ Regular" panose="01000506000000020004" pitchFamily="2" charset="-78"/>
                 <a:cs typeface="B Nazanin+ Regular" panose="01000506000000020004" pitchFamily="2" charset="-78"/>
               </a:rPr>
-              <a:t> </a:t>
-            </a:r>
-            <a:r>
-              <a:rPr lang="fa-IR" sz="4000" b="1" dirty="0" smtClean="0">
-                <a:solidFill>
-                  <a:schemeClr val="tx1"/>
-                </a:solidFill>
-                <a:effectLst>
-                  <a:outerShdw blurRad="38100" dist="38100" dir="2700000" algn="tl">
-                    <a:srgbClr val="000000">
-                      <a:alpha val="43137"/>
-                    </a:srgbClr>
-                  </a:outerShdw>
-                </a:effectLst>
-                <a:latin typeface="B Nazanin+ Regular" panose="01000506000000020004" pitchFamily="2" charset="-78"/>
-                <a:cs typeface="B Nazanin+ Regular" panose="01000506000000020004" pitchFamily="2" charset="-78"/>
-              </a:rPr>
-              <a:t> مراجع </a:t>
+              <a:t>  مراجع </a:t>
             </a:r>
             <a:endParaRPr lang="en-US" sz="4000" b="1" dirty="0">
               <a:solidFill>
@@ -13439,492 +12733,6 @@
                     <a:lumMod val="75000"/>
                   </a:schemeClr>
                 </a:solidFill>
-                <a:latin typeface="B Nazanin+ Regular" panose="01000506000000020004" pitchFamily="2" charset="-78"/>
-                <a:cs typeface="B Nazanin+ Regular" panose="01000506000000020004" pitchFamily="2" charset="-78"/>
-              </a:rPr>
-              <a:t>کدگذاری عددی</a:t>
-            </a:r>
-            <a:endParaRPr lang="en-US" sz="6000" b="1" dirty="0">
-              <a:solidFill>
-                <a:schemeClr val="accent6">
-                  <a:lumMod val="75000"/>
-                </a:schemeClr>
-              </a:solidFill>
-              <a:latin typeface="B Nazanin+ Regular" panose="01000506000000020004" pitchFamily="2" charset="-78"/>
-              <a:cs typeface="B Nazanin+ Regular" panose="01000506000000020004" pitchFamily="2" charset="-78"/>
-            </a:endParaRPr>
-          </a:p>
-        </p:txBody>
-      </p:sp>
-      <p:sp>
-        <p:nvSpPr>
-          <p:cNvPr id="3" name="Content Placeholder 2"/>
-          <p:cNvSpPr>
-            <a:spLocks noGrp="1"/>
-          </p:cNvSpPr>
-          <p:nvPr>
-            <p:ph idx="1"/>
-          </p:nvPr>
-        </p:nvSpPr>
-        <p:spPr>
-          <a:xfrm>
-            <a:off x="216569" y="1239253"/>
-            <a:ext cx="11288044" cy="5618747"/>
-          </a:xfrm>
-        </p:spPr>
-        <p:txBody>
-          <a:bodyPr>
-            <a:noAutofit/>
-          </a:bodyPr>
-          <a:lstStyle/>
-          <a:p>
-            <a:pPr algn="r" rtl="1">
-              <a:lnSpc>
-                <a:spcPct val="150000"/>
-              </a:lnSpc>
-              <a:buFont typeface="Wingdings" panose="05000000000000000000" pitchFamily="2" charset="2"/>
-              <a:buChar char="ü"/>
-            </a:pPr>
-            <a:r>
-              <a:rPr lang="fa-IR" sz="4400" b="1" dirty="0" smtClean="0">
-                <a:solidFill>
-                  <a:schemeClr val="tx1"/>
-                </a:solidFill>
-                <a:effectLst>
-                  <a:outerShdw blurRad="38100" dist="38100" dir="2700000" algn="tl">
-                    <a:srgbClr val="000000">
-                      <a:alpha val="43137"/>
-                    </a:srgbClr>
-                  </a:outerShdw>
-                </a:effectLst>
-                <a:latin typeface="B Nazanin+ Regular" panose="01000506000000020004" pitchFamily="2" charset="-78"/>
-                <a:cs typeface="B Nazanin+ Regular" panose="01000506000000020004" pitchFamily="2" charset="-78"/>
-              </a:rPr>
-              <a:t> استفاده از الگوریتم های پیچیده تر </a:t>
-            </a:r>
-          </a:p>
-          <a:p>
-            <a:pPr algn="r" rtl="1">
-              <a:lnSpc>
-                <a:spcPct val="150000"/>
-              </a:lnSpc>
-              <a:buFont typeface="Wingdings" panose="05000000000000000000" pitchFamily="2" charset="2"/>
-              <a:buChar char="ü"/>
-            </a:pPr>
-            <a:r>
-              <a:rPr lang="fa-IR" sz="4400" b="1" dirty="0">
-                <a:solidFill>
-                  <a:schemeClr val="tx1"/>
-                </a:solidFill>
-                <a:effectLst>
-                  <a:outerShdw blurRad="38100" dist="38100" dir="2700000" algn="tl">
-                    <a:srgbClr val="000000">
-                      <a:alpha val="43137"/>
-                    </a:srgbClr>
-                  </a:outerShdw>
-                </a:effectLst>
-                <a:latin typeface="B Nazanin+ Regular" panose="01000506000000020004" pitchFamily="2" charset="-78"/>
-                <a:cs typeface="B Nazanin+ Regular" panose="01000506000000020004" pitchFamily="2" charset="-78"/>
-              </a:rPr>
-              <a:t> </a:t>
-            </a:r>
-            <a:r>
-              <a:rPr lang="fa-IR" sz="4400" b="1" dirty="0" smtClean="0">
-                <a:solidFill>
-                  <a:schemeClr val="tx1"/>
-                </a:solidFill>
-                <a:effectLst>
-                  <a:outerShdw blurRad="38100" dist="38100" dir="2700000" algn="tl">
-                    <a:srgbClr val="000000">
-                      <a:alpha val="43137"/>
-                    </a:srgbClr>
-                  </a:outerShdw>
-                </a:effectLst>
-                <a:latin typeface="B Nazanin+ Regular" panose="01000506000000020004" pitchFamily="2" charset="-78"/>
-                <a:cs typeface="B Nazanin+ Regular" panose="01000506000000020004" pitchFamily="2" charset="-78"/>
-              </a:rPr>
-              <a:t>استفاده از کلید های بزرگتر (تعداد بیت بیشتر)</a:t>
-            </a:r>
-            <a:endParaRPr lang="fa-IR" sz="4400" b="1" dirty="0" smtClean="0">
-              <a:solidFill>
-                <a:schemeClr val="tx1"/>
-              </a:solidFill>
-              <a:effectLst>
-                <a:outerShdw blurRad="38100" dist="38100" dir="2700000" algn="tl">
-                  <a:srgbClr val="000000">
-                    <a:alpha val="43137"/>
-                  </a:srgbClr>
-                </a:outerShdw>
-              </a:effectLst>
-              <a:latin typeface="B Nazanin+ Regular" panose="01000506000000020004" pitchFamily="2" charset="-78"/>
-              <a:cs typeface="B Nazanin+ Regular" panose="01000506000000020004" pitchFamily="2" charset="-78"/>
-            </a:endParaRPr>
-          </a:p>
-          <a:p>
-            <a:pPr algn="r" rtl="1">
-              <a:buFont typeface="Wingdings" panose="05000000000000000000" pitchFamily="2" charset="2"/>
-              <a:buChar char="ü"/>
-            </a:pPr>
-            <a:endParaRPr lang="fa-IR" sz="4000" b="1" dirty="0" smtClean="0">
-              <a:solidFill>
-                <a:schemeClr val="tx1"/>
-              </a:solidFill>
-              <a:effectLst>
-                <a:outerShdw blurRad="38100" dist="38100" dir="2700000" algn="tl">
-                  <a:srgbClr val="000000">
-                    <a:alpha val="43137"/>
-                  </a:srgbClr>
-                </a:outerShdw>
-              </a:effectLst>
-              <a:latin typeface="B Nazanin+ Regular" panose="01000506000000020004" pitchFamily="2" charset="-78"/>
-              <a:cs typeface="B Nazanin+ Regular" panose="01000506000000020004" pitchFamily="2" charset="-78"/>
-            </a:endParaRPr>
-          </a:p>
-        </p:txBody>
-      </p:sp>
-      <p:pic>
-        <p:nvPicPr>
-          <p:cNvPr id="4" name="Picture 3"/>
-          <p:cNvPicPr>
-            <a:picLocks noChangeAspect="1"/>
-          </p:cNvPicPr>
-          <p:nvPr/>
-        </p:nvPicPr>
-        <p:blipFill>
-          <a:blip r:embed="rId2">
-            <a:extLst>
-              <a:ext uri="{28A0092B-C50C-407E-A947-70E740481C1C}">
-                <a14:useLocalDpi xmlns:a14="http://schemas.microsoft.com/office/drawing/2010/main" val="0"/>
-              </a:ext>
-            </a:extLst>
-          </a:blip>
-          <a:stretch>
-            <a:fillRect/>
-          </a:stretch>
-        </p:blipFill>
-        <p:spPr>
-          <a:xfrm>
-            <a:off x="1267594" y="3777915"/>
-            <a:ext cx="6262317" cy="2983832"/>
-          </a:xfrm>
-          <a:prstGeom prst="rect">
-            <a:avLst/>
-          </a:prstGeom>
-        </p:spPr>
-      </p:pic>
-    </p:spTree>
-    <p:extLst>
-      <p:ext uri="{BB962C8B-B14F-4D97-AF65-F5344CB8AC3E}">
-        <p14:creationId xmlns:p14="http://schemas.microsoft.com/office/powerpoint/2010/main" val="931649030"/>
-      </p:ext>
-    </p:extLst>
-  </p:cSld>
-  <p:clrMapOvr>
-    <a:masterClrMapping/>
-  </p:clrMapOvr>
-  <p:timing>
-    <p:tnLst>
-      <p:par>
-        <p:cTn id="1" dur="indefinite" restart="never" nodeType="tmRoot">
-          <p:childTnLst>
-            <p:seq concurrent="1" nextAc="seek">
-              <p:cTn id="2" dur="indefinite" nodeType="mainSeq">
-                <p:childTnLst>
-                  <p:par>
-                    <p:cTn id="3" fill="hold">
-                      <p:stCondLst>
-                        <p:cond delay="indefinite"/>
-                      </p:stCondLst>
-                      <p:childTnLst>
-                        <p:par>
-                          <p:cTn id="4" fill="hold">
-                            <p:stCondLst>
-                              <p:cond delay="0"/>
-                            </p:stCondLst>
-                            <p:childTnLst>
-                              <p:par>
-                                <p:cTn id="5" presetID="1" presetClass="entr" presetSubtype="0" fill="hold" grpId="0" nodeType="clickEffect">
-                                  <p:stCondLst>
-                                    <p:cond delay="0"/>
-                                  </p:stCondLst>
-                                  <p:childTnLst>
-                                    <p:set>
-                                      <p:cBhvr>
-                                        <p:cTn id="6" dur="1" fill="hold">
-                                          <p:stCondLst>
-                                            <p:cond delay="0"/>
-                                          </p:stCondLst>
-                                        </p:cTn>
-                                        <p:tgtEl>
-                                          <p:spTgt spid="3">
-                                            <p:txEl>
-                                              <p:pRg st="0" end="0"/>
-                                            </p:txEl>
-                                          </p:spTgt>
-                                        </p:tgtEl>
-                                        <p:attrNameLst>
-                                          <p:attrName>style.visibility</p:attrName>
-                                        </p:attrNameLst>
-                                      </p:cBhvr>
-                                      <p:to>
-                                        <p:strVal val="visible"/>
-                                      </p:to>
-                                    </p:set>
-                                  </p:childTnLst>
-                                </p:cTn>
-                              </p:par>
-                            </p:childTnLst>
-                          </p:cTn>
-                        </p:par>
-                      </p:childTnLst>
-                    </p:cTn>
-                  </p:par>
-                  <p:par>
-                    <p:cTn id="7" fill="hold">
-                      <p:stCondLst>
-                        <p:cond delay="indefinite"/>
-                      </p:stCondLst>
-                      <p:childTnLst>
-                        <p:par>
-                          <p:cTn id="8" fill="hold">
-                            <p:stCondLst>
-                              <p:cond delay="0"/>
-                            </p:stCondLst>
-                            <p:childTnLst>
-                              <p:par>
-                                <p:cTn id="9" presetID="1" presetClass="entr" presetSubtype="0" fill="hold" grpId="0" nodeType="clickEffect">
-                                  <p:stCondLst>
-                                    <p:cond delay="0"/>
-                                  </p:stCondLst>
-                                  <p:childTnLst>
-                                    <p:set>
-                                      <p:cBhvr>
-                                        <p:cTn id="10" dur="1" fill="hold">
-                                          <p:stCondLst>
-                                            <p:cond delay="0"/>
-                                          </p:stCondLst>
-                                        </p:cTn>
-                                        <p:tgtEl>
-                                          <p:spTgt spid="3">
-                                            <p:txEl>
-                                              <p:pRg st="1" end="1"/>
-                                            </p:txEl>
-                                          </p:spTgt>
-                                        </p:tgtEl>
-                                        <p:attrNameLst>
-                                          <p:attrName>style.visibility</p:attrName>
-                                        </p:attrNameLst>
-                                      </p:cBhvr>
-                                      <p:to>
-                                        <p:strVal val="visible"/>
-                                      </p:to>
-                                    </p:set>
-                                  </p:childTnLst>
-                                </p:cTn>
-                              </p:par>
-                            </p:childTnLst>
-                          </p:cTn>
-                        </p:par>
-                      </p:childTnLst>
-                    </p:cTn>
-                  </p:par>
-                  <p:par>
-                    <p:cTn id="11" fill="hold">
-                      <p:stCondLst>
-                        <p:cond delay="indefinite"/>
-                      </p:stCondLst>
-                      <p:childTnLst>
-                        <p:par>
-                          <p:cTn id="12" fill="hold">
-                            <p:stCondLst>
-                              <p:cond delay="0"/>
-                            </p:stCondLst>
-                            <p:childTnLst>
-                              <p:par>
-                                <p:cTn id="13" presetID="31" presetClass="entr" presetSubtype="0" fill="hold" nodeType="clickEffect">
-                                  <p:stCondLst>
-                                    <p:cond delay="0"/>
-                                  </p:stCondLst>
-                                  <p:childTnLst>
-                                    <p:set>
-                                      <p:cBhvr>
-                                        <p:cTn id="14" dur="1" fill="hold">
-                                          <p:stCondLst>
-                                            <p:cond delay="0"/>
-                                          </p:stCondLst>
-                                        </p:cTn>
-                                        <p:tgtEl>
-                                          <p:spTgt spid="4"/>
-                                        </p:tgtEl>
-                                        <p:attrNameLst>
-                                          <p:attrName>style.visibility</p:attrName>
-                                        </p:attrNameLst>
-                                      </p:cBhvr>
-                                      <p:to>
-                                        <p:strVal val="visible"/>
-                                      </p:to>
-                                    </p:set>
-                                    <p:anim calcmode="lin" valueType="num">
-                                      <p:cBhvr>
-                                        <p:cTn id="15" dur="1000" fill="hold"/>
-                                        <p:tgtEl>
-                                          <p:spTgt spid="4"/>
-                                        </p:tgtEl>
-                                        <p:attrNameLst>
-                                          <p:attrName>ppt_w</p:attrName>
-                                        </p:attrNameLst>
-                                      </p:cBhvr>
-                                      <p:tavLst>
-                                        <p:tav tm="0">
-                                          <p:val>
-                                            <p:fltVal val="0"/>
-                                          </p:val>
-                                        </p:tav>
-                                        <p:tav tm="100000">
-                                          <p:val>
-                                            <p:strVal val="#ppt_w"/>
-                                          </p:val>
-                                        </p:tav>
-                                      </p:tavLst>
-                                    </p:anim>
-                                    <p:anim calcmode="lin" valueType="num">
-                                      <p:cBhvr>
-                                        <p:cTn id="16" dur="1000" fill="hold"/>
-                                        <p:tgtEl>
-                                          <p:spTgt spid="4"/>
-                                        </p:tgtEl>
-                                        <p:attrNameLst>
-                                          <p:attrName>ppt_h</p:attrName>
-                                        </p:attrNameLst>
-                                      </p:cBhvr>
-                                      <p:tavLst>
-                                        <p:tav tm="0">
-                                          <p:val>
-                                            <p:fltVal val="0"/>
-                                          </p:val>
-                                        </p:tav>
-                                        <p:tav tm="100000">
-                                          <p:val>
-                                            <p:strVal val="#ppt_h"/>
-                                          </p:val>
-                                        </p:tav>
-                                      </p:tavLst>
-                                    </p:anim>
-                                    <p:anim calcmode="lin" valueType="num">
-                                      <p:cBhvr>
-                                        <p:cTn id="17" dur="1000" fill="hold"/>
-                                        <p:tgtEl>
-                                          <p:spTgt spid="4"/>
-                                        </p:tgtEl>
-                                        <p:attrNameLst>
-                                          <p:attrName>style.rotation</p:attrName>
-                                        </p:attrNameLst>
-                                      </p:cBhvr>
-                                      <p:tavLst>
-                                        <p:tav tm="0">
-                                          <p:val>
-                                            <p:fltVal val="90"/>
-                                          </p:val>
-                                        </p:tav>
-                                        <p:tav tm="100000">
-                                          <p:val>
-                                            <p:fltVal val="0"/>
-                                          </p:val>
-                                        </p:tav>
-                                      </p:tavLst>
-                                    </p:anim>
-                                    <p:animEffect transition="in" filter="fade">
-                                      <p:cBhvr>
-                                        <p:cTn id="18" dur="1000"/>
-                                        <p:tgtEl>
-                                          <p:spTgt spid="4"/>
-                                        </p:tgtEl>
-                                      </p:cBhvr>
-                                    </p:animEffect>
-                                  </p:childTnLst>
-                                </p:cTn>
-                              </p:par>
-                            </p:childTnLst>
-                          </p:cTn>
-                        </p:par>
-                      </p:childTnLst>
-                    </p:cTn>
-                  </p:par>
-                </p:childTnLst>
-              </p:cTn>
-              <p:prevCondLst>
-                <p:cond evt="onPrev" delay="0">
-                  <p:tgtEl>
-                    <p:sldTgt/>
-                  </p:tgtEl>
-                </p:cond>
-              </p:prevCondLst>
-              <p:nextCondLst>
-                <p:cond evt="onNext" delay="0">
-                  <p:tgtEl>
-                    <p:sldTgt/>
-                  </p:tgtEl>
-                </p:cond>
-              </p:nextCondLst>
-            </p:seq>
-          </p:childTnLst>
-        </p:cTn>
-      </p:par>
-    </p:tnLst>
-    <p:bldLst>
-      <p:bldP spid="3" grpId="0" build="p"/>
-    </p:bldLst>
-  </p:timing>
-</p:sld>
-</file>
-
-<file path=ppt/slides/slide22.xml><?xml version="1.0" encoding="utf-8"?>
-<p:sld xmlns:a="http://schemas.openxmlformats.org/drawingml/2006/main" xmlns:r="http://schemas.openxmlformats.org/officeDocument/2006/relationships" xmlns:p="http://schemas.openxmlformats.org/presentationml/2006/main">
-  <p:cSld>
-    <p:spTree>
-      <p:nvGrpSpPr>
-        <p:cNvPr id="1" name=""/>
-        <p:cNvGrpSpPr/>
-        <p:nvPr/>
-      </p:nvGrpSpPr>
-      <p:grpSpPr>
-        <a:xfrm>
-          <a:off x="0" y="0"/>
-          <a:ext cx="0" cy="0"/>
-          <a:chOff x="0" y="0"/>
-          <a:chExt cx="0" cy="0"/>
-        </a:xfrm>
-      </p:grpSpPr>
-      <p:sp>
-        <p:nvSpPr>
-          <p:cNvPr id="2" name="Title 1"/>
-          <p:cNvSpPr>
-            <a:spLocks noGrp="1"/>
-          </p:cNvSpPr>
-          <p:nvPr>
-            <p:ph type="title"/>
-          </p:nvPr>
-        </p:nvSpPr>
-        <p:spPr>
-          <a:xfrm>
-            <a:off x="2592925" y="407542"/>
-            <a:ext cx="8911687" cy="964058"/>
-          </a:xfrm>
-        </p:spPr>
-        <p:txBody>
-          <a:bodyPr>
-            <a:normAutofit/>
-          </a:bodyPr>
-          <a:lstStyle/>
-          <a:p>
-            <a:pPr algn="r" rtl="1"/>
-            <a:r>
-              <a:rPr lang="fa-IR" sz="6000" b="1" dirty="0" smtClean="0">
-                <a:solidFill>
-                  <a:schemeClr val="accent6">
-                    <a:lumMod val="75000"/>
-                  </a:schemeClr>
-                </a:solidFill>
                 <a:effectLst>
                   <a:outerShdw blurRad="38100" dist="38100" dir="2700000" algn="tl">
                     <a:srgbClr val="000000">
@@ -14002,20 +12810,6 @@
               </a:rPr>
               <a:t> یک کلید مشترک برای کاربر و سرور </a:t>
             </a:r>
-            <a:endParaRPr lang="fa-IR" sz="4400" b="1" dirty="0" smtClean="0">
-              <a:solidFill>
-                <a:schemeClr val="tx1"/>
-              </a:solidFill>
-              <a:effectLst>
-                <a:outerShdw blurRad="38100" dist="38100" dir="2700000" algn="tl">
-                  <a:srgbClr val="000000">
-                    <a:alpha val="43137"/>
-                  </a:srgbClr>
-                </a:outerShdw>
-              </a:effectLst>
-              <a:latin typeface="B Nazanin+ Regular" panose="01000506000000020004" pitchFamily="2" charset="-78"/>
-              <a:cs typeface="B Nazanin+ Regular" panose="01000506000000020004" pitchFamily="2" charset="-78"/>
-            </a:endParaRPr>
           </a:p>
           <a:p>
             <a:pPr algn="r" rtl="1">
@@ -14059,20 +12853,6 @@
               </a:rPr>
               <a:t>این کلید مشترک را کلید عمومی می نامند .</a:t>
             </a:r>
-            <a:endParaRPr lang="fa-IR" sz="4400" b="1" dirty="0" smtClean="0">
-              <a:solidFill>
-                <a:schemeClr val="tx1"/>
-              </a:solidFill>
-              <a:effectLst>
-                <a:outerShdw blurRad="38100" dist="38100" dir="2700000" algn="tl">
-                  <a:srgbClr val="000000">
-                    <a:alpha val="43137"/>
-                  </a:srgbClr>
-                </a:outerShdw>
-              </a:effectLst>
-              <a:latin typeface="B Nazanin+ Regular" panose="01000506000000020004" pitchFamily="2" charset="-78"/>
-              <a:cs typeface="B Nazanin+ Regular" panose="01000506000000020004" pitchFamily="2" charset="-78"/>
-            </a:endParaRPr>
           </a:p>
         </p:txBody>
       </p:sp>
@@ -14220,7 +13000,7 @@
 </p:sld>
 </file>
 
-<file path=ppt/slides/slide23.xml><?xml version="1.0" encoding="utf-8"?>
+<file path=ppt/slides/slide22.xml><?xml version="1.0" encoding="utf-8"?>
 <p:sld xmlns:a="http://schemas.openxmlformats.org/drawingml/2006/main" xmlns:r="http://schemas.openxmlformats.org/officeDocument/2006/relationships" xmlns:p="http://schemas.openxmlformats.org/presentationml/2006/main">
   <p:cSld>
     <p:spTree>
@@ -14296,8 +13076,8 @@
           </a:p>
         </p:txBody>
       </p:sp>
-      <mc:AlternateContent xmlns:mc="http://schemas.openxmlformats.org/markup-compatibility/2006">
-        <mc:Choice xmlns:a14="http://schemas.microsoft.com/office/drawing/2010/main" Requires="a14">
+      <mc:AlternateContent xmlns:mc="http://schemas.openxmlformats.org/markup-compatibility/2006" xmlns:a14="http://schemas.microsoft.com/office/drawing/2010/main">
+        <mc:Choice Requires="a14">
           <p:sp>
             <p:nvSpPr>
               <p:cNvPr id="3" name="Content Placeholder 2"/>
@@ -14494,7 +13274,7 @@
             </p:txBody>
           </p:sp>
         </mc:Choice>
-        <mc:Fallback>
+        <mc:Fallback xmlns="">
           <p:sp>
             <p:nvSpPr>
               <p:cNvPr id="3" name="Content Placeholder 2"/>
@@ -14840,7 +13620,7 @@
 </p:sld>
 </file>
 
-<file path=ppt/slides/slide24.xml><?xml version="1.0" encoding="utf-8"?>
+<file path=ppt/slides/slide23.xml><?xml version="1.0" encoding="utf-8"?>
 <p:sld xmlns:a="http://schemas.openxmlformats.org/drawingml/2006/main" xmlns:r="http://schemas.openxmlformats.org/officeDocument/2006/relationships" xmlns:p="http://schemas.openxmlformats.org/presentationml/2006/main">
   <p:cSld>
     <p:spTree>
@@ -14962,41 +13742,7 @@
                 <a:latin typeface="B Nazanin+ Regular" panose="01000506000000020004" pitchFamily="2" charset="-78"/>
                 <a:cs typeface="B Nazanin+ Regular" panose="01000506000000020004" pitchFamily="2" charset="-78"/>
               </a:rPr>
-              <a:t> سرور یک کلید عمومی برای </a:t>
-            </a:r>
-            <a:r>
-              <a:rPr lang="fa-IR" sz="4400" b="1" dirty="0" smtClean="0">
-                <a:solidFill>
-                  <a:schemeClr val="tx1"/>
-                </a:solidFill>
-                <a:effectLst>
-                  <a:outerShdw blurRad="38100" dist="38100" dir="2700000" algn="tl">
-                    <a:srgbClr val="000000">
-                      <a:alpha val="43137"/>
-                    </a:srgbClr>
-                  </a:outerShdw>
-                </a:effectLst>
-                <a:latin typeface="B Nazanin+ Regular" panose="01000506000000020004" pitchFamily="2" charset="-78"/>
-                <a:cs typeface="B Nazanin+ Regular" panose="01000506000000020004" pitchFamily="2" charset="-78"/>
-              </a:rPr>
-              <a:t>کاربر </a:t>
-            </a:r>
-            <a:r>
-              <a:rPr lang="fa-IR" sz="4400" b="1" dirty="0" smtClean="0">
-                <a:solidFill>
-                  <a:schemeClr val="tx1"/>
-                </a:solidFill>
-                <a:effectLst>
-                  <a:outerShdw blurRad="38100" dist="38100" dir="2700000" algn="tl">
-                    <a:srgbClr val="000000">
-                      <a:alpha val="43137"/>
-                    </a:srgbClr>
-                  </a:outerShdw>
-                </a:effectLst>
-                <a:latin typeface="B Nazanin+ Regular" panose="01000506000000020004" pitchFamily="2" charset="-78"/>
-                <a:cs typeface="B Nazanin+ Regular" panose="01000506000000020004" pitchFamily="2" charset="-78"/>
-              </a:rPr>
-              <a:t>ارسال می کند .</a:t>
+              <a:t> سرور یک کلید عمومی برای کاربر ارسال می کند .</a:t>
             </a:r>
           </a:p>
           <a:p>
@@ -15294,7 +14040,7 @@
 </p:sld>
 </file>
 
-<file path=ppt/slides/slide25.xml><?xml version="1.0" encoding="utf-8"?>
+<file path=ppt/slides/slide24.xml><?xml version="1.0" encoding="utf-8"?>
 <p:sld xmlns:a="http://schemas.openxmlformats.org/drawingml/2006/main" xmlns:r="http://schemas.openxmlformats.org/officeDocument/2006/relationships" xmlns:p="http://schemas.openxmlformats.org/presentationml/2006/main">
   <p:cSld>
     <p:spTree>
@@ -15438,20 +14184,6 @@
               </a:rPr>
               <a:t>)</a:t>
             </a:r>
-            <a:endParaRPr lang="fa-IR" sz="4400" b="1" dirty="0" smtClean="0">
-              <a:solidFill>
-                <a:schemeClr val="tx1"/>
-              </a:solidFill>
-              <a:effectLst>
-                <a:outerShdw blurRad="38100" dist="38100" dir="2700000" algn="tl">
-                  <a:srgbClr val="000000">
-                    <a:alpha val="43137"/>
-                  </a:srgbClr>
-                </a:outerShdw>
-              </a:effectLst>
-              <a:latin typeface="B Nazanin+ Regular" panose="01000506000000020004" pitchFamily="2" charset="-78"/>
-              <a:cs typeface="B Nazanin+ Regular" panose="01000506000000020004" pitchFamily="2" charset="-78"/>
-            </a:endParaRPr>
           </a:p>
           <a:p>
             <a:pPr algn="r" rtl="1">
@@ -15544,24 +14276,7 @@
                 <a:latin typeface="B Nazanin+ Regular" panose="01000506000000020004" pitchFamily="2" charset="-78"/>
                 <a:cs typeface="B Nazanin+ Regular" panose="01000506000000020004" pitchFamily="2" charset="-78"/>
               </a:rPr>
-              <a:t>)</a:t>
-            </a:r>
-            <a:r>
-              <a:rPr lang="fa-IR" sz="4400" b="1" dirty="0" smtClean="0">
-                <a:solidFill>
-                  <a:schemeClr val="tx1"/>
-                </a:solidFill>
-                <a:effectLst>
-                  <a:outerShdw blurRad="38100" dist="38100" dir="2700000" algn="tl">
-                    <a:srgbClr val="000000">
-                      <a:alpha val="43137"/>
-                    </a:srgbClr>
-                  </a:outerShdw>
-                </a:effectLst>
-                <a:latin typeface="B Nazanin+ Regular" panose="01000506000000020004" pitchFamily="2" charset="-78"/>
-                <a:cs typeface="B Nazanin+ Regular" panose="01000506000000020004" pitchFamily="2" charset="-78"/>
-              </a:rPr>
-              <a:t> </a:t>
+              <a:t>) </a:t>
             </a:r>
             <a:endParaRPr lang="en-US" sz="4400" b="1" dirty="0" smtClean="0">
               <a:solidFill>
@@ -15914,7 +14629,7 @@
 </p:sld>
 </file>
 
-<file path=ppt/slides/slide26.xml><?xml version="1.0" encoding="utf-8"?>
+<file path=ppt/slides/slide25.xml><?xml version="1.0" encoding="utf-8"?>
 <p:sld xmlns:a="http://schemas.openxmlformats.org/drawingml/2006/main" xmlns:r="http://schemas.openxmlformats.org/officeDocument/2006/relationships" xmlns:p="http://schemas.openxmlformats.org/presentationml/2006/main">
   <p:cSld>
     <p:spTree>
@@ -16360,43 +15075,8 @@
                 <a:latin typeface="B Nazanin+ Regular" panose="01000506000000020004" pitchFamily="2" charset="-78"/>
                 <a:cs typeface="B Nazanin+ Regular" panose="01000506000000020004" pitchFamily="2" charset="-78"/>
               </a:rPr>
-              <a:t> </a:t>
-            </a:r>
-            <a:r>
-              <a:rPr lang="fa-IR" sz="4000" b="1" dirty="0" smtClean="0">
-                <a:solidFill>
-                  <a:schemeClr val="accent1">
-                    <a:lumMod val="75000"/>
-                  </a:schemeClr>
-                </a:solidFill>
-                <a:effectLst>
-                  <a:outerShdw blurRad="38100" dist="38100" dir="2700000" algn="tl">
-                    <a:srgbClr val="000000">
-                      <a:alpha val="43137"/>
-                    </a:srgbClr>
-                  </a:outerShdw>
-                </a:effectLst>
-                <a:latin typeface="B Nazanin+ Regular" panose="01000506000000020004" pitchFamily="2" charset="-78"/>
-                <a:cs typeface="B Nazanin+ Regular" panose="01000506000000020004" pitchFamily="2" charset="-78"/>
-              </a:rPr>
-              <a:t>رمز گذاری</a:t>
-            </a:r>
-            <a:endParaRPr lang="fa-IR" sz="4000" b="1" dirty="0" smtClean="0">
-              <a:solidFill>
-                <a:schemeClr val="accent1">
-                  <a:lumMod val="75000"/>
-                </a:schemeClr>
-              </a:solidFill>
-              <a:effectLst>
-                <a:outerShdw blurRad="38100" dist="38100" dir="2700000" algn="tl">
-                  <a:srgbClr val="000000">
-                    <a:alpha val="43137"/>
-                  </a:srgbClr>
-                </a:outerShdw>
-              </a:effectLst>
-              <a:latin typeface="B Nazanin+ Regular" panose="01000506000000020004" pitchFamily="2" charset="-78"/>
-              <a:cs typeface="B Nazanin+ Regular" panose="01000506000000020004" pitchFamily="2" charset="-78"/>
-            </a:endParaRPr>
+              <a:t> رمز گذاری</a:t>
+            </a:r>
           </a:p>
           <a:p>
             <a:pPr algn="r" rtl="1">
@@ -16421,24 +15101,7 @@
                 <a:latin typeface="B Nazanin+ Regular" panose="01000506000000020004" pitchFamily="2" charset="-78"/>
                 <a:cs typeface="B Nazanin+ Regular" panose="01000506000000020004" pitchFamily="2" charset="-78"/>
               </a:rPr>
-              <a:t>  </a:t>
-            </a:r>
-            <a:r>
-              <a:rPr lang="fa-IR" sz="4000" b="1" dirty="0" smtClean="0">
-                <a:solidFill>
-                  <a:schemeClr val="tx1"/>
-                </a:solidFill>
-                <a:effectLst>
-                  <a:outerShdw blurRad="38100" dist="38100" dir="2700000" algn="tl">
-                    <a:srgbClr val="000000">
-                      <a:alpha val="43137"/>
-                    </a:srgbClr>
-                  </a:outerShdw>
-                </a:effectLst>
-                <a:latin typeface="B Nazanin+ Regular" panose="01000506000000020004" pitchFamily="2" charset="-78"/>
-                <a:cs typeface="B Nazanin+ Regular" panose="01000506000000020004" pitchFamily="2" charset="-78"/>
-              </a:rPr>
-              <a:t>نتیجه گیری </a:t>
+              <a:t>  نتیجه گیری </a:t>
             </a:r>
             <a:endParaRPr lang="en-US" sz="4000" b="1" dirty="0" smtClean="0">
               <a:solidFill>
@@ -16480,26 +15143,7 @@
                 <a:latin typeface="B Nazanin+ Regular" panose="01000506000000020004" pitchFamily="2" charset="-78"/>
                 <a:cs typeface="B Nazanin+ Regular" panose="01000506000000020004" pitchFamily="2" charset="-78"/>
               </a:rPr>
-              <a:t> </a:t>
-            </a:r>
-            <a:r>
-              <a:rPr lang="fa-IR" sz="4000" b="1" dirty="0" smtClean="0">
-                <a:solidFill>
-                  <a:schemeClr val="accent1">
-                    <a:lumMod val="75000"/>
-                  </a:schemeClr>
-                </a:solidFill>
-                <a:effectLst>
-                  <a:outerShdw blurRad="38100" dist="38100" dir="2700000" algn="tl">
-                    <a:srgbClr val="000000">
-                      <a:alpha val="43137"/>
-                    </a:srgbClr>
-                  </a:outerShdw>
-                </a:effectLst>
-                <a:latin typeface="B Nazanin+ Regular" panose="01000506000000020004" pitchFamily="2" charset="-78"/>
-                <a:cs typeface="B Nazanin+ Regular" panose="01000506000000020004" pitchFamily="2" charset="-78"/>
-              </a:rPr>
-              <a:t> مراجع </a:t>
+              <a:t>  مراجع </a:t>
             </a:r>
             <a:endParaRPr lang="en-US" sz="4000" b="1" dirty="0">
               <a:solidFill>
@@ -16548,7 +15192,7 @@
 </p:sld>
 </file>
 
-<file path=ppt/slides/slide27.xml><?xml version="1.0" encoding="utf-8"?>
+<file path=ppt/slides/slide26.xml><?xml version="1.0" encoding="utf-8"?>
 <p:sld xmlns:a="http://schemas.openxmlformats.org/drawingml/2006/main" xmlns:r="http://schemas.openxmlformats.org/officeDocument/2006/relationships" xmlns:p="http://schemas.openxmlformats.org/presentationml/2006/main">
   <p:cSld>
     <p:spTree>
@@ -16866,20 +15510,6 @@
               </a:rPr>
               <a:t>امنیت =&gt; از نظر امنیت خیال ما راحت است .</a:t>
             </a:r>
-            <a:endParaRPr lang="fa-IR" sz="4400" b="1" dirty="0" smtClean="0">
-              <a:solidFill>
-                <a:schemeClr val="tx1"/>
-              </a:solidFill>
-              <a:effectLst>
-                <a:outerShdw blurRad="38100" dist="38100" dir="2700000" algn="tl">
-                  <a:srgbClr val="000000">
-                    <a:alpha val="43137"/>
-                  </a:srgbClr>
-                </a:outerShdw>
-              </a:effectLst>
-              <a:latin typeface="B Nazanin+ Regular" panose="01000506000000020004" pitchFamily="2" charset="-78"/>
-              <a:cs typeface="B Nazanin+ Regular" panose="01000506000000020004" pitchFamily="2" charset="-78"/>
-            </a:endParaRPr>
           </a:p>
         </p:txBody>
       </p:sp>
@@ -17125,7 +15755,7 @@
 </p:sld>
 </file>
 
-<file path=ppt/slides/slide28.xml><?xml version="1.0" encoding="utf-8"?>
+<file path=ppt/slides/slide27.xml><?xml version="1.0" encoding="utf-8"?>
 <p:sld xmlns:a="http://schemas.openxmlformats.org/drawingml/2006/main" xmlns:r="http://schemas.openxmlformats.org/officeDocument/2006/relationships" xmlns:p="http://schemas.openxmlformats.org/presentationml/2006/main">
   <p:cSld>
     <p:spTree>
@@ -17571,43 +16201,8 @@
                 <a:latin typeface="B Nazanin+ Regular" panose="01000506000000020004" pitchFamily="2" charset="-78"/>
                 <a:cs typeface="B Nazanin+ Regular" panose="01000506000000020004" pitchFamily="2" charset="-78"/>
               </a:rPr>
-              <a:t> </a:t>
-            </a:r>
-            <a:r>
-              <a:rPr lang="fa-IR" sz="4000" b="1" dirty="0" smtClean="0">
-                <a:solidFill>
-                  <a:schemeClr val="accent1">
-                    <a:lumMod val="75000"/>
-                  </a:schemeClr>
-                </a:solidFill>
-                <a:effectLst>
-                  <a:outerShdw blurRad="38100" dist="38100" dir="2700000" algn="tl">
-                    <a:srgbClr val="000000">
-                      <a:alpha val="43137"/>
-                    </a:srgbClr>
-                  </a:outerShdw>
-                </a:effectLst>
-                <a:latin typeface="B Nazanin+ Regular" panose="01000506000000020004" pitchFamily="2" charset="-78"/>
-                <a:cs typeface="B Nazanin+ Regular" panose="01000506000000020004" pitchFamily="2" charset="-78"/>
-              </a:rPr>
-              <a:t>رمز گذاری</a:t>
-            </a:r>
-            <a:endParaRPr lang="fa-IR" sz="4000" b="1" dirty="0" smtClean="0">
-              <a:solidFill>
-                <a:schemeClr val="accent1">
-                  <a:lumMod val="75000"/>
-                </a:schemeClr>
-              </a:solidFill>
-              <a:effectLst>
-                <a:outerShdw blurRad="38100" dist="38100" dir="2700000" algn="tl">
-                  <a:srgbClr val="000000">
-                    <a:alpha val="43137"/>
-                  </a:srgbClr>
-                </a:outerShdw>
-              </a:effectLst>
-              <a:latin typeface="B Nazanin+ Regular" panose="01000506000000020004" pitchFamily="2" charset="-78"/>
-              <a:cs typeface="B Nazanin+ Regular" panose="01000506000000020004" pitchFamily="2" charset="-78"/>
-            </a:endParaRPr>
+              <a:t> رمز گذاری</a:t>
+            </a:r>
           </a:p>
           <a:p>
             <a:pPr algn="r" rtl="1">
@@ -17634,26 +16229,7 @@
                 <a:latin typeface="B Nazanin+ Regular" panose="01000506000000020004" pitchFamily="2" charset="-78"/>
                 <a:cs typeface="B Nazanin+ Regular" panose="01000506000000020004" pitchFamily="2" charset="-78"/>
               </a:rPr>
-              <a:t>  </a:t>
-            </a:r>
-            <a:r>
-              <a:rPr lang="fa-IR" sz="4000" b="1" dirty="0" smtClean="0">
-                <a:solidFill>
-                  <a:schemeClr val="accent1">
-                    <a:lumMod val="75000"/>
-                  </a:schemeClr>
-                </a:solidFill>
-                <a:effectLst>
-                  <a:outerShdw blurRad="38100" dist="38100" dir="2700000" algn="tl">
-                    <a:srgbClr val="000000">
-                      <a:alpha val="43137"/>
-                    </a:srgbClr>
-                  </a:outerShdw>
-                </a:effectLst>
-                <a:latin typeface="B Nazanin+ Regular" panose="01000506000000020004" pitchFamily="2" charset="-78"/>
-                <a:cs typeface="B Nazanin+ Regular" panose="01000506000000020004" pitchFamily="2" charset="-78"/>
-              </a:rPr>
-              <a:t>نتیجه گیری </a:t>
+              <a:t>  نتیجه گیری </a:t>
             </a:r>
             <a:endParaRPr lang="en-US" sz="4000" b="1" dirty="0" smtClean="0">
               <a:solidFill>
@@ -17695,24 +16271,7 @@
                 <a:latin typeface="B Nazanin+ Regular" panose="01000506000000020004" pitchFamily="2" charset="-78"/>
                 <a:cs typeface="B Nazanin+ Regular" panose="01000506000000020004" pitchFamily="2" charset="-78"/>
               </a:rPr>
-              <a:t> </a:t>
-            </a:r>
-            <a:r>
-              <a:rPr lang="fa-IR" sz="4000" b="1" dirty="0" smtClean="0">
-                <a:solidFill>
-                  <a:schemeClr val="tx1"/>
-                </a:solidFill>
-                <a:effectLst>
-                  <a:outerShdw blurRad="38100" dist="38100" dir="2700000" algn="tl">
-                    <a:srgbClr val="000000">
-                      <a:alpha val="43137"/>
-                    </a:srgbClr>
-                  </a:outerShdw>
-                </a:effectLst>
-                <a:latin typeface="B Nazanin+ Regular" panose="01000506000000020004" pitchFamily="2" charset="-78"/>
-                <a:cs typeface="B Nazanin+ Regular" panose="01000506000000020004" pitchFamily="2" charset="-78"/>
-              </a:rPr>
-              <a:t> مراجع </a:t>
+              <a:t>  مراجع </a:t>
             </a:r>
             <a:endParaRPr lang="en-US" sz="4000" b="1" dirty="0">
               <a:solidFill>
@@ -17759,7 +16318,7 @@
 </p:sld>
 </file>
 
-<file path=ppt/slides/slide29.xml><?xml version="1.0" encoding="utf-8"?>
+<file path=ppt/slides/slide28.xml><?xml version="1.0" encoding="utf-8"?>
 <p:sld xmlns:a="http://schemas.openxmlformats.org/drawingml/2006/main" xmlns:r="http://schemas.openxmlformats.org/officeDocument/2006/relationships" xmlns:p="http://schemas.openxmlformats.org/presentationml/2006/main">
   <p:cSld>
     <p:spTree>
@@ -17917,39 +16476,8 @@
                 <a:latin typeface="B Nazanin+ Regular" panose="01000506000000020004" pitchFamily="2" charset="-78"/>
                 <a:cs typeface="B Nazanin+ Regular" panose="01000506000000020004" pitchFamily="2" charset="-78"/>
               </a:rPr>
-              <a:t>Guide (Chapter 13 , </a:t>
-            </a:r>
-            <a:r>
-              <a:rPr lang="en-US" sz="4000" b="1" dirty="0" smtClean="0">
-                <a:solidFill>
-                  <a:schemeClr val="tx1"/>
-                </a:solidFill>
-                <a:effectLst>
-                  <a:outerShdw blurRad="38100" dist="38100" dir="2700000" algn="tl">
-                    <a:srgbClr val="000000">
-                      <a:alpha val="43137"/>
-                    </a:srgbClr>
-                  </a:outerShdw>
-                </a:effectLst>
-                <a:latin typeface="B Nazanin+ Regular" panose="01000506000000020004" pitchFamily="2" charset="-78"/>
-                <a:cs typeface="B Nazanin+ Regular" panose="01000506000000020004" pitchFamily="2" charset="-78"/>
-              </a:rPr>
-              <a:t>14)</a:t>
-            </a:r>
-            <a:endParaRPr lang="en-US" sz="4000" b="1" dirty="0" smtClean="0">
-              <a:solidFill>
-                <a:schemeClr val="tx1"/>
-              </a:solidFill>
-              <a:effectLst>
-                <a:outerShdw blurRad="38100" dist="38100" dir="2700000" algn="tl">
-                  <a:srgbClr val="000000">
-                    <a:alpha val="43137"/>
-                  </a:srgbClr>
-                </a:outerShdw>
-              </a:effectLst>
-              <a:latin typeface="B Nazanin+ Regular" panose="01000506000000020004" pitchFamily="2" charset="-78"/>
-              <a:cs typeface="B Nazanin+ Regular" panose="01000506000000020004" pitchFamily="2" charset="-78"/>
-            </a:endParaRPr>
+              <a:t>Guide (Chapter 13 , 14)</a:t>
+            </a:r>
           </a:p>
           <a:p>
             <a:pPr marL="0" indent="0">
@@ -17990,10 +16518,10 @@
                 <a:latin typeface="B Nazanin+ Regular" panose="01000506000000020004" pitchFamily="2" charset="-78"/>
                 <a:cs typeface="B Nazanin+ Regular" panose="01000506000000020004" pitchFamily="2" charset="-78"/>
               </a:rPr>
-              <a:t>[2] .  </a:t>
-            </a:r>
-            <a:r>
-              <a:rPr lang="en-US" sz="4000" b="1" dirty="0" smtClean="0">
+              <a:t>[2] .  SSL And TLS  Essentials-Securing The Web</a:t>
+            </a:r>
+            <a:r>
+              <a:rPr lang="en-US" sz="3000" b="1" dirty="0" smtClean="0">
                 <a:solidFill>
                   <a:schemeClr val="tx1"/>
                 </a:solidFill>
@@ -18007,39 +16535,8 @@
                 <a:latin typeface="B Nazanin+ Regular" panose="01000506000000020004" pitchFamily="2" charset="-78"/>
                 <a:cs typeface="B Nazanin+ Regular" panose="01000506000000020004" pitchFamily="2" charset="-78"/>
               </a:rPr>
-              <a:t>SSL And TLS  Essentials-Securing The Web</a:t>
-            </a:r>
-            <a:r>
-              <a:rPr lang="en-US" sz="3000" b="1" dirty="0" smtClean="0">
-                <a:solidFill>
-                  <a:schemeClr val="tx1"/>
-                </a:solidFill>
-                <a:effectLst>
-                  <a:outerShdw blurRad="38100" dist="38100" dir="2700000" algn="tl">
-                    <a:srgbClr val="000000">
-                      <a:alpha val="43137"/>
-                    </a:srgbClr>
-                  </a:outerShdw>
-                </a:effectLst>
-                <a:latin typeface="B Nazanin+ Regular" panose="01000506000000020004" pitchFamily="2" charset="-78"/>
-                <a:cs typeface="B Nazanin+ Regular" panose="01000506000000020004" pitchFamily="2" charset="-78"/>
-              </a:rPr>
               <a:t>(Stephen Tomas)</a:t>
             </a:r>
-            <a:endParaRPr lang="en-US" sz="3000" b="1" dirty="0" smtClean="0">
-              <a:solidFill>
-                <a:schemeClr val="tx1"/>
-              </a:solidFill>
-              <a:effectLst>
-                <a:outerShdw blurRad="38100" dist="38100" dir="2700000" algn="tl">
-                  <a:srgbClr val="000000">
-                    <a:alpha val="43137"/>
-                  </a:srgbClr>
-                </a:outerShdw>
-              </a:effectLst>
-              <a:latin typeface="B Nazanin+ Regular" panose="01000506000000020004" pitchFamily="2" charset="-78"/>
-              <a:cs typeface="B Nazanin+ Regular" panose="01000506000000020004" pitchFamily="2" charset="-78"/>
-            </a:endParaRPr>
           </a:p>
           <a:p>
             <a:pPr marL="0" indent="0">
@@ -18434,666 +16931,7 @@
 </p:sld>
 </file>
 
-<file path=ppt/slides/slide3.xml><?xml version="1.0" encoding="utf-8"?>
-<p:sld xmlns:a="http://schemas.openxmlformats.org/drawingml/2006/main" xmlns:r="http://schemas.openxmlformats.org/officeDocument/2006/relationships" xmlns:p="http://schemas.openxmlformats.org/presentationml/2006/main">
-  <p:cSld>
-    <p:spTree>
-      <p:nvGrpSpPr>
-        <p:cNvPr id="1" name=""/>
-        <p:cNvGrpSpPr/>
-        <p:nvPr/>
-      </p:nvGrpSpPr>
-      <p:grpSpPr>
-        <a:xfrm>
-          <a:off x="0" y="0"/>
-          <a:ext cx="0" cy="0"/>
-          <a:chOff x="0" y="0"/>
-          <a:chExt cx="0" cy="0"/>
-        </a:xfrm>
-      </p:grpSpPr>
-      <p:sp>
-        <p:nvSpPr>
-          <p:cNvPr id="2" name="Title 1"/>
-          <p:cNvSpPr>
-            <a:spLocks noGrp="1"/>
-          </p:cNvSpPr>
-          <p:nvPr>
-            <p:ph type="title"/>
-          </p:nvPr>
-        </p:nvSpPr>
-        <p:spPr>
-          <a:xfrm>
-            <a:off x="830179" y="190973"/>
-            <a:ext cx="10674433" cy="964058"/>
-          </a:xfrm>
-        </p:spPr>
-        <p:txBody>
-          <a:bodyPr>
-            <a:normAutofit/>
-          </a:bodyPr>
-          <a:lstStyle/>
-          <a:p>
-            <a:pPr algn="r" rtl="1"/>
-            <a:r>
-              <a:rPr lang="fa-IR" sz="6000" b="1" dirty="0">
-                <a:solidFill>
-                  <a:schemeClr val="accent6">
-                    <a:lumMod val="75000"/>
-                  </a:schemeClr>
-                </a:solidFill>
-                <a:effectLst>
-                  <a:outerShdw blurRad="38100" dist="38100" dir="2700000" algn="tl">
-                    <a:srgbClr val="000000">
-                      <a:alpha val="43137"/>
-                    </a:srgbClr>
-                  </a:outerShdw>
-                </a:effectLst>
-                <a:latin typeface="B Nazanin+ Regular" panose="01000506000000020004" pitchFamily="2" charset="-78"/>
-                <a:cs typeface="B Nazanin+ Regular" panose="01000506000000020004" pitchFamily="2" charset="-78"/>
-              </a:rPr>
-              <a:t>چارچوب </a:t>
-            </a:r>
-            <a:endParaRPr lang="en-US" sz="6000" b="1" dirty="0">
-              <a:effectLst>
-                <a:outerShdw blurRad="38100" dist="38100" dir="2700000" algn="tl">
-                  <a:srgbClr val="000000">
-                    <a:alpha val="43137"/>
-                  </a:srgbClr>
-                </a:outerShdw>
-              </a:effectLst>
-              <a:latin typeface="B Nazanin+ Regular" panose="01000506000000020004" pitchFamily="2" charset="-78"/>
-              <a:cs typeface="B Nazanin+ Regular" panose="01000506000000020004" pitchFamily="2" charset="-78"/>
-            </a:endParaRPr>
-          </a:p>
-        </p:txBody>
-      </p:sp>
-      <p:sp>
-        <p:nvSpPr>
-          <p:cNvPr id="3" name="Content Placeholder 2"/>
-          <p:cNvSpPr>
-            <a:spLocks noGrp="1"/>
-          </p:cNvSpPr>
-          <p:nvPr>
-            <p:ph idx="1"/>
-          </p:nvPr>
-        </p:nvSpPr>
-        <p:spPr>
-          <a:xfrm>
-            <a:off x="2081463" y="1155031"/>
-            <a:ext cx="9423149" cy="5558590"/>
-          </a:xfrm>
-        </p:spPr>
-        <p:txBody>
-          <a:bodyPr>
-            <a:noAutofit/>
-          </a:bodyPr>
-          <a:lstStyle/>
-          <a:p>
-            <a:pPr algn="r" rtl="1">
-              <a:lnSpc>
-                <a:spcPct val="100000"/>
-              </a:lnSpc>
-              <a:buFont typeface="Wingdings" panose="05000000000000000000" pitchFamily="2" charset="2"/>
-              <a:buChar char="ü"/>
-            </a:pPr>
-            <a:r>
-              <a:rPr lang="en-US" sz="4000" b="1" dirty="0" smtClean="0">
-                <a:solidFill>
-                  <a:schemeClr val="tx1"/>
-                </a:solidFill>
-                <a:effectLst>
-                  <a:outerShdw blurRad="38100" dist="38100" dir="2700000" algn="tl">
-                    <a:srgbClr val="000000">
-                      <a:alpha val="43137"/>
-                    </a:srgbClr>
-                  </a:outerShdw>
-                </a:effectLst>
-                <a:latin typeface="B Nazanin+ Regular" panose="01000506000000020004" pitchFamily="2" charset="-78"/>
-                <a:cs typeface="B Nazanin+ Regular" panose="01000506000000020004" pitchFamily="2" charset="-78"/>
-              </a:rPr>
-              <a:t>  </a:t>
-            </a:r>
-            <a:r>
-              <a:rPr lang="fa-IR" sz="4000" b="1" dirty="0" smtClean="0">
-                <a:solidFill>
-                  <a:schemeClr val="tx1"/>
-                </a:solidFill>
-                <a:effectLst>
-                  <a:outerShdw blurRad="38100" dist="38100" dir="2700000" algn="tl">
-                    <a:srgbClr val="000000">
-                      <a:alpha val="43137"/>
-                    </a:srgbClr>
-                  </a:outerShdw>
-                </a:effectLst>
-                <a:latin typeface="B Nazanin+ Regular" panose="01000506000000020004" pitchFamily="2" charset="-78"/>
-                <a:cs typeface="B Nazanin+ Regular" panose="01000506000000020004" pitchFamily="2" charset="-78"/>
-              </a:rPr>
-              <a:t>مقدمه </a:t>
-            </a:r>
-            <a:endParaRPr lang="fa-IR" sz="4000" b="1" dirty="0" smtClean="0">
-              <a:solidFill>
-                <a:schemeClr val="accent1">
-                  <a:lumMod val="75000"/>
-                </a:schemeClr>
-              </a:solidFill>
-              <a:effectLst>
-                <a:outerShdw blurRad="38100" dist="38100" dir="2700000" algn="tl">
-                  <a:srgbClr val="000000">
-                    <a:alpha val="43137"/>
-                  </a:srgbClr>
-                </a:outerShdw>
-              </a:effectLst>
-              <a:latin typeface="B Nazanin+ Regular" panose="01000506000000020004" pitchFamily="2" charset="-78"/>
-              <a:cs typeface="B Nazanin+ Regular" panose="01000506000000020004" pitchFamily="2" charset="-78"/>
-            </a:endParaRPr>
-          </a:p>
-          <a:p>
-            <a:pPr algn="r" rtl="1">
-              <a:lnSpc>
-                <a:spcPct val="100000"/>
-              </a:lnSpc>
-              <a:buFont typeface="Wingdings" panose="05000000000000000000" pitchFamily="2" charset="2"/>
-              <a:buChar char="ü"/>
-            </a:pPr>
-            <a:r>
-              <a:rPr lang="fa-IR" sz="4000" b="1" dirty="0" smtClean="0">
-                <a:solidFill>
-                  <a:schemeClr val="accent1">
-                    <a:lumMod val="75000"/>
-                  </a:schemeClr>
-                </a:solidFill>
-                <a:effectLst>
-                  <a:outerShdw blurRad="38100" dist="38100" dir="2700000" algn="tl">
-                    <a:srgbClr val="000000">
-                      <a:alpha val="43137"/>
-                    </a:srgbClr>
-                  </a:outerShdw>
-                </a:effectLst>
-                <a:latin typeface="B Nazanin+ Regular" panose="01000506000000020004" pitchFamily="2" charset="-78"/>
-                <a:cs typeface="B Nazanin+ Regular" panose="01000506000000020004" pitchFamily="2" charset="-78"/>
-              </a:rPr>
-              <a:t> </a:t>
-            </a:r>
-            <a:r>
-              <a:rPr lang="en-US" sz="4000" b="1" dirty="0" smtClean="0">
-                <a:solidFill>
-                  <a:schemeClr val="accent1">
-                    <a:lumMod val="75000"/>
-                  </a:schemeClr>
-                </a:solidFill>
-                <a:effectLst>
-                  <a:outerShdw blurRad="38100" dist="38100" dir="2700000" algn="tl">
-                    <a:srgbClr val="000000">
-                      <a:alpha val="43137"/>
-                    </a:srgbClr>
-                  </a:outerShdw>
-                </a:effectLst>
-                <a:latin typeface="B Nazanin+ Regular" panose="01000506000000020004" pitchFamily="2" charset="-78"/>
-                <a:cs typeface="B Nazanin+ Regular" panose="01000506000000020004" pitchFamily="2" charset="-78"/>
-              </a:rPr>
-              <a:t> </a:t>
-            </a:r>
-            <a:r>
-              <a:rPr lang="fa-IR" sz="4000" b="1" dirty="0" smtClean="0">
-                <a:solidFill>
-                  <a:schemeClr val="accent1">
-                    <a:lumMod val="75000"/>
-                  </a:schemeClr>
-                </a:solidFill>
-                <a:effectLst>
-                  <a:outerShdw blurRad="38100" dist="38100" dir="2700000" algn="tl">
-                    <a:srgbClr val="000000">
-                      <a:alpha val="43137"/>
-                    </a:srgbClr>
-                  </a:outerShdw>
-                </a:effectLst>
-                <a:latin typeface="B Nazanin+ Regular" panose="01000506000000020004" pitchFamily="2" charset="-78"/>
-                <a:cs typeface="B Nazanin+ Regular" panose="01000506000000020004" pitchFamily="2" charset="-78"/>
-              </a:rPr>
-              <a:t>پروکسی سرور (</a:t>
-            </a:r>
-            <a:r>
-              <a:rPr lang="en-US" sz="4000" b="1" dirty="0" smtClean="0">
-                <a:solidFill>
-                  <a:schemeClr val="accent1">
-                    <a:lumMod val="75000"/>
-                  </a:schemeClr>
-                </a:solidFill>
-                <a:effectLst>
-                  <a:outerShdw blurRad="38100" dist="38100" dir="2700000" algn="tl">
-                    <a:srgbClr val="000000">
-                      <a:alpha val="43137"/>
-                    </a:srgbClr>
-                  </a:outerShdw>
-                </a:effectLst>
-                <a:latin typeface="B Nazanin+ Regular" panose="01000506000000020004" pitchFamily="2" charset="-78"/>
-                <a:cs typeface="B Nazanin+ Regular" panose="01000506000000020004" pitchFamily="2" charset="-78"/>
-              </a:rPr>
-              <a:t>proxy</a:t>
-            </a:r>
-            <a:r>
-              <a:rPr lang="fa-IR" sz="4000" b="1" dirty="0" smtClean="0">
-                <a:solidFill>
-                  <a:schemeClr val="accent1">
-                    <a:lumMod val="75000"/>
-                  </a:schemeClr>
-                </a:solidFill>
-                <a:effectLst>
-                  <a:outerShdw blurRad="38100" dist="38100" dir="2700000" algn="tl">
-                    <a:srgbClr val="000000">
-                      <a:alpha val="43137"/>
-                    </a:srgbClr>
-                  </a:outerShdw>
-                </a:effectLst>
-                <a:latin typeface="B Nazanin+ Regular" panose="01000506000000020004" pitchFamily="2" charset="-78"/>
-                <a:cs typeface="B Nazanin+ Regular" panose="01000506000000020004" pitchFamily="2" charset="-78"/>
-              </a:rPr>
-              <a:t>)</a:t>
-            </a:r>
-            <a:endParaRPr lang="en-US" sz="4000" b="1" dirty="0" smtClean="0">
-              <a:solidFill>
-                <a:schemeClr val="accent1">
-                  <a:lumMod val="75000"/>
-                </a:schemeClr>
-              </a:solidFill>
-              <a:effectLst>
-                <a:outerShdw blurRad="38100" dist="38100" dir="2700000" algn="tl">
-                  <a:srgbClr val="000000">
-                    <a:alpha val="43137"/>
-                  </a:srgbClr>
-                </a:outerShdw>
-              </a:effectLst>
-              <a:latin typeface="B Nazanin+ Regular" panose="01000506000000020004" pitchFamily="2" charset="-78"/>
-              <a:cs typeface="B Nazanin+ Regular" panose="01000506000000020004" pitchFamily="2" charset="-78"/>
-            </a:endParaRPr>
-          </a:p>
-          <a:p>
-            <a:pPr algn="r" rtl="1">
-              <a:lnSpc>
-                <a:spcPct val="100000"/>
-              </a:lnSpc>
-              <a:buFont typeface="Wingdings" panose="05000000000000000000" pitchFamily="2" charset="2"/>
-              <a:buChar char="ü"/>
-            </a:pPr>
-            <a:r>
-              <a:rPr lang="fa-IR" sz="4000" b="1" dirty="0" smtClean="0">
-                <a:solidFill>
-                  <a:schemeClr val="accent1">
-                    <a:lumMod val="75000"/>
-                  </a:schemeClr>
-                </a:solidFill>
-                <a:effectLst>
-                  <a:outerShdw blurRad="38100" dist="38100" dir="2700000" algn="tl">
-                    <a:srgbClr val="000000">
-                      <a:alpha val="43137"/>
-                    </a:srgbClr>
-                  </a:outerShdw>
-                </a:effectLst>
-                <a:latin typeface="B Nazanin+ Regular" panose="01000506000000020004" pitchFamily="2" charset="-78"/>
-                <a:cs typeface="B Nazanin+ Regular" panose="01000506000000020004" pitchFamily="2" charset="-78"/>
-              </a:rPr>
-              <a:t>  </a:t>
-            </a:r>
-            <a:r>
-              <a:rPr lang="en-US" sz="4000" b="1" dirty="0" smtClean="0">
-                <a:solidFill>
-                  <a:schemeClr val="accent1">
-                    <a:lumMod val="75000"/>
-                  </a:schemeClr>
-                </a:solidFill>
-                <a:effectLst>
-                  <a:outerShdw blurRad="38100" dist="38100" dir="2700000" algn="tl">
-                    <a:srgbClr val="000000">
-                      <a:alpha val="43137"/>
-                    </a:srgbClr>
-                  </a:outerShdw>
-                </a:effectLst>
-                <a:latin typeface="B Nazanin+ Regular" panose="01000506000000020004" pitchFamily="2" charset="-78"/>
-                <a:cs typeface="B Nazanin+ Regular" panose="01000506000000020004" pitchFamily="2" charset="-78"/>
-              </a:rPr>
-              <a:t> HTTPS</a:t>
-            </a:r>
-            <a:r>
-              <a:rPr lang="fa-IR" sz="4000" b="1" dirty="0" smtClean="0">
-                <a:solidFill>
-                  <a:schemeClr val="accent1">
-                    <a:lumMod val="75000"/>
-                  </a:schemeClr>
-                </a:solidFill>
-                <a:effectLst>
-                  <a:outerShdw blurRad="38100" dist="38100" dir="2700000" algn="tl">
-                    <a:srgbClr val="000000">
-                      <a:alpha val="43137"/>
-                    </a:srgbClr>
-                  </a:outerShdw>
-                </a:effectLst>
-                <a:latin typeface="B Nazanin+ Regular" panose="01000506000000020004" pitchFamily="2" charset="-78"/>
-                <a:cs typeface="B Nazanin+ Regular" panose="01000506000000020004" pitchFamily="2" charset="-78"/>
-              </a:rPr>
-              <a:t> </a:t>
-            </a:r>
-            <a:endParaRPr lang="en-US" sz="4000" b="1" dirty="0" smtClean="0">
-              <a:solidFill>
-                <a:schemeClr val="accent1">
-                  <a:lumMod val="75000"/>
-                </a:schemeClr>
-              </a:solidFill>
-              <a:effectLst>
-                <a:outerShdw blurRad="38100" dist="38100" dir="2700000" algn="tl">
-                  <a:srgbClr val="000000">
-                    <a:alpha val="43137"/>
-                  </a:srgbClr>
-                </a:outerShdw>
-              </a:effectLst>
-              <a:latin typeface="B Nazanin+ Regular" panose="01000506000000020004" pitchFamily="2" charset="-78"/>
-              <a:cs typeface="B Nazanin+ Regular" panose="01000506000000020004" pitchFamily="2" charset="-78"/>
-            </a:endParaRPr>
-          </a:p>
-          <a:p>
-            <a:pPr algn="r" rtl="1">
-              <a:lnSpc>
-                <a:spcPct val="100000"/>
-              </a:lnSpc>
-              <a:buFont typeface="Wingdings" panose="05000000000000000000" pitchFamily="2" charset="2"/>
-              <a:buChar char="ü"/>
-            </a:pPr>
-            <a:r>
-              <a:rPr lang="en-US" sz="4000" b="1" dirty="0" smtClean="0">
-                <a:solidFill>
-                  <a:schemeClr val="accent1">
-                    <a:lumMod val="75000"/>
-                  </a:schemeClr>
-                </a:solidFill>
-                <a:effectLst>
-                  <a:outerShdw blurRad="38100" dist="38100" dir="2700000" algn="tl">
-                    <a:srgbClr val="000000">
-                      <a:alpha val="43137"/>
-                    </a:srgbClr>
-                  </a:outerShdw>
-                </a:effectLst>
-                <a:latin typeface="B Nazanin+ Regular" panose="01000506000000020004" pitchFamily="2" charset="-78"/>
-                <a:cs typeface="B Nazanin+ Regular" panose="01000506000000020004" pitchFamily="2" charset="-78"/>
-              </a:rPr>
-              <a:t> TLS  </a:t>
-            </a:r>
-            <a:r>
-              <a:rPr lang="fa-IR" sz="4000" b="1" dirty="0" smtClean="0">
-                <a:solidFill>
-                  <a:schemeClr val="accent1">
-                    <a:lumMod val="75000"/>
-                  </a:schemeClr>
-                </a:solidFill>
-                <a:effectLst>
-                  <a:outerShdw blurRad="38100" dist="38100" dir="2700000" algn="tl">
-                    <a:srgbClr val="000000">
-                      <a:alpha val="43137"/>
-                    </a:srgbClr>
-                  </a:outerShdw>
-                </a:effectLst>
-                <a:latin typeface="B Nazanin+ Regular" panose="01000506000000020004" pitchFamily="2" charset="-78"/>
-                <a:cs typeface="B Nazanin+ Regular" panose="01000506000000020004" pitchFamily="2" charset="-78"/>
-              </a:rPr>
-              <a:t>و </a:t>
-            </a:r>
-            <a:r>
-              <a:rPr lang="en-US" sz="4000" b="1" dirty="0" smtClean="0">
-                <a:solidFill>
-                  <a:schemeClr val="accent1">
-                    <a:lumMod val="75000"/>
-                  </a:schemeClr>
-                </a:solidFill>
-                <a:effectLst>
-                  <a:outerShdw blurRad="38100" dist="38100" dir="2700000" algn="tl">
-                    <a:srgbClr val="000000">
-                      <a:alpha val="43137"/>
-                    </a:srgbClr>
-                  </a:outerShdw>
-                </a:effectLst>
-                <a:latin typeface="B Nazanin+ Regular" panose="01000506000000020004" pitchFamily="2" charset="-78"/>
-                <a:cs typeface="B Nazanin+ Regular" panose="01000506000000020004" pitchFamily="2" charset="-78"/>
-              </a:rPr>
-              <a:t>SSL</a:t>
-            </a:r>
-          </a:p>
-          <a:p>
-            <a:pPr algn="r" rtl="1">
-              <a:lnSpc>
-                <a:spcPct val="100000"/>
-              </a:lnSpc>
-              <a:buFont typeface="Wingdings" panose="05000000000000000000" pitchFamily="2" charset="2"/>
-              <a:buChar char="ü"/>
-            </a:pPr>
-            <a:r>
-              <a:rPr lang="en-US" sz="4000" b="1" dirty="0">
-                <a:solidFill>
-                  <a:schemeClr val="accent1">
-                    <a:lumMod val="75000"/>
-                  </a:schemeClr>
-                </a:solidFill>
-                <a:effectLst>
-                  <a:outerShdw blurRad="38100" dist="38100" dir="2700000" algn="tl">
-                    <a:srgbClr val="000000">
-                      <a:alpha val="43137"/>
-                    </a:srgbClr>
-                  </a:outerShdw>
-                </a:effectLst>
-                <a:latin typeface="B Nazanin+ Regular" panose="01000506000000020004" pitchFamily="2" charset="-78"/>
-                <a:cs typeface="B Nazanin+ Regular" panose="01000506000000020004" pitchFamily="2" charset="-78"/>
-              </a:rPr>
-              <a:t> </a:t>
-            </a:r>
-            <a:r>
-              <a:rPr lang="fa-IR" sz="4000" b="1" dirty="0" smtClean="0">
-                <a:solidFill>
-                  <a:schemeClr val="accent1">
-                    <a:lumMod val="75000"/>
-                  </a:schemeClr>
-                </a:solidFill>
-                <a:effectLst>
-                  <a:outerShdw blurRad="38100" dist="38100" dir="2700000" algn="tl">
-                    <a:srgbClr val="000000">
-                      <a:alpha val="43137"/>
-                    </a:srgbClr>
-                  </a:outerShdw>
-                </a:effectLst>
-                <a:latin typeface="B Nazanin+ Regular" panose="01000506000000020004" pitchFamily="2" charset="-78"/>
-                <a:cs typeface="B Nazanin+ Regular" panose="01000506000000020004" pitchFamily="2" charset="-78"/>
-              </a:rPr>
-              <a:t> </a:t>
-            </a:r>
-            <a:r>
-              <a:rPr lang="fa-IR" sz="4000" b="1" dirty="0" smtClean="0">
-                <a:solidFill>
-                  <a:schemeClr val="accent1">
-                    <a:lumMod val="75000"/>
-                  </a:schemeClr>
-                </a:solidFill>
-                <a:effectLst>
-                  <a:outerShdw blurRad="38100" dist="38100" dir="2700000" algn="tl">
-                    <a:srgbClr val="000000">
-                      <a:alpha val="43137"/>
-                    </a:srgbClr>
-                  </a:outerShdw>
-                </a:effectLst>
-                <a:latin typeface="B Nazanin+ Regular" panose="01000506000000020004" pitchFamily="2" charset="-78"/>
-                <a:cs typeface="B Nazanin+ Regular" panose="01000506000000020004" pitchFamily="2" charset="-78"/>
-              </a:rPr>
-              <a:t>رمز گذاری</a:t>
-            </a:r>
-            <a:endParaRPr lang="fa-IR" sz="4000" b="1" dirty="0" smtClean="0">
-              <a:solidFill>
-                <a:schemeClr val="accent1">
-                  <a:lumMod val="75000"/>
-                </a:schemeClr>
-              </a:solidFill>
-              <a:effectLst>
-                <a:outerShdw blurRad="38100" dist="38100" dir="2700000" algn="tl">
-                  <a:srgbClr val="000000">
-                    <a:alpha val="43137"/>
-                  </a:srgbClr>
-                </a:outerShdw>
-              </a:effectLst>
-              <a:latin typeface="B Nazanin+ Regular" panose="01000506000000020004" pitchFamily="2" charset="-78"/>
-              <a:cs typeface="B Nazanin+ Regular" panose="01000506000000020004" pitchFamily="2" charset="-78"/>
-            </a:endParaRPr>
-          </a:p>
-          <a:p>
-            <a:pPr algn="r" rtl="1">
-              <a:lnSpc>
-                <a:spcPct val="100000"/>
-              </a:lnSpc>
-              <a:buFont typeface="Wingdings" panose="05000000000000000000" pitchFamily="2" charset="2"/>
-              <a:buChar char="ü"/>
-            </a:pPr>
-            <a:r>
-              <a:rPr lang="fa-IR" sz="4000" b="1" dirty="0" smtClean="0">
-                <a:solidFill>
-                  <a:schemeClr val="accent1">
-                    <a:lumMod val="75000"/>
-                  </a:schemeClr>
-                </a:solidFill>
-                <a:effectLst>
-                  <a:outerShdw blurRad="38100" dist="38100" dir="2700000" algn="tl">
-                    <a:srgbClr val="000000">
-                      <a:alpha val="43137"/>
-                    </a:srgbClr>
-                  </a:outerShdw>
-                </a:effectLst>
-                <a:latin typeface="B Nazanin+ Regular" panose="01000506000000020004" pitchFamily="2" charset="-78"/>
-                <a:cs typeface="B Nazanin+ Regular" panose="01000506000000020004" pitchFamily="2" charset="-78"/>
-              </a:rPr>
-              <a:t>  </a:t>
-            </a:r>
-            <a:r>
-              <a:rPr lang="fa-IR" sz="4000" b="1" dirty="0" smtClean="0">
-                <a:solidFill>
-                  <a:schemeClr val="accent1">
-                    <a:lumMod val="75000"/>
-                  </a:schemeClr>
-                </a:solidFill>
-                <a:effectLst>
-                  <a:outerShdw blurRad="38100" dist="38100" dir="2700000" algn="tl">
-                    <a:srgbClr val="000000">
-                      <a:alpha val="43137"/>
-                    </a:srgbClr>
-                  </a:outerShdw>
-                </a:effectLst>
-                <a:latin typeface="B Nazanin+ Regular" panose="01000506000000020004" pitchFamily="2" charset="-78"/>
-                <a:cs typeface="B Nazanin+ Regular" panose="01000506000000020004" pitchFamily="2" charset="-78"/>
-              </a:rPr>
-              <a:t>نتیجه گیری </a:t>
-            </a:r>
-            <a:endParaRPr lang="en-US" sz="4000" b="1" dirty="0" smtClean="0">
-              <a:solidFill>
-                <a:schemeClr val="accent1">
-                  <a:lumMod val="75000"/>
-                </a:schemeClr>
-              </a:solidFill>
-              <a:effectLst>
-                <a:outerShdw blurRad="38100" dist="38100" dir="2700000" algn="tl">
-                  <a:srgbClr val="000000">
-                    <a:alpha val="43137"/>
-                  </a:srgbClr>
-                </a:outerShdw>
-              </a:effectLst>
-              <a:latin typeface="B Nazanin+ Regular" panose="01000506000000020004" pitchFamily="2" charset="-78"/>
-              <a:cs typeface="B Nazanin+ Regular" panose="01000506000000020004" pitchFamily="2" charset="-78"/>
-            </a:endParaRPr>
-          </a:p>
-          <a:p>
-            <a:pPr algn="r" rtl="1">
-              <a:lnSpc>
-                <a:spcPct val="100000"/>
-              </a:lnSpc>
-              <a:buFont typeface="Wingdings" panose="05000000000000000000" pitchFamily="2" charset="2"/>
-              <a:buChar char="ü"/>
-            </a:pPr>
-            <a:r>
-              <a:rPr lang="fa-IR" sz="4000" b="1" dirty="0" smtClean="0">
-                <a:solidFill>
-                  <a:schemeClr val="accent1">
-                    <a:lumMod val="75000"/>
-                  </a:schemeClr>
-                </a:solidFill>
-                <a:effectLst>
-                  <a:outerShdw blurRad="38100" dist="38100" dir="2700000" algn="tl">
-                    <a:srgbClr val="000000">
-                      <a:alpha val="43137"/>
-                    </a:srgbClr>
-                  </a:outerShdw>
-                </a:effectLst>
-                <a:latin typeface="B Nazanin+ Regular" panose="01000506000000020004" pitchFamily="2" charset="-78"/>
-                <a:cs typeface="B Nazanin+ Regular" panose="01000506000000020004" pitchFamily="2" charset="-78"/>
-              </a:rPr>
-              <a:t> </a:t>
-            </a:r>
-            <a:r>
-              <a:rPr lang="fa-IR" sz="4000" b="1" dirty="0" smtClean="0">
-                <a:solidFill>
-                  <a:schemeClr val="accent1">
-                    <a:lumMod val="75000"/>
-                  </a:schemeClr>
-                </a:solidFill>
-                <a:effectLst>
-                  <a:outerShdw blurRad="38100" dist="38100" dir="2700000" algn="tl">
-                    <a:srgbClr val="000000">
-                      <a:alpha val="43137"/>
-                    </a:srgbClr>
-                  </a:outerShdw>
-                </a:effectLst>
-                <a:latin typeface="B Nazanin+ Regular" panose="01000506000000020004" pitchFamily="2" charset="-78"/>
-                <a:cs typeface="B Nazanin+ Regular" panose="01000506000000020004" pitchFamily="2" charset="-78"/>
-              </a:rPr>
-              <a:t> مراجع </a:t>
-            </a:r>
-            <a:endParaRPr lang="en-US" sz="4000" b="1" dirty="0">
-              <a:solidFill>
-                <a:schemeClr val="accent1">
-                  <a:lumMod val="75000"/>
-                </a:schemeClr>
-              </a:solidFill>
-              <a:effectLst>
-                <a:outerShdw blurRad="38100" dist="38100" dir="2700000" algn="tl">
-                  <a:srgbClr val="000000">
-                    <a:alpha val="43137"/>
-                  </a:srgbClr>
-                </a:outerShdw>
-              </a:effectLst>
-              <a:latin typeface="B Nazanin+ Regular" panose="01000506000000020004" pitchFamily="2" charset="-78"/>
-              <a:cs typeface="B Nazanin+ Regular" panose="01000506000000020004" pitchFamily="2" charset="-78"/>
-            </a:endParaRPr>
-          </a:p>
-        </p:txBody>
-      </p:sp>
-    </p:spTree>
-    <p:extLst>
-      <p:ext uri="{BB962C8B-B14F-4D97-AF65-F5344CB8AC3E}">
-        <p14:creationId xmlns:p14="http://schemas.microsoft.com/office/powerpoint/2010/main" val="2616989132"/>
-      </p:ext>
-    </p:extLst>
-  </p:cSld>
-  <p:clrMapOvr>
-    <a:masterClrMapping/>
-  </p:clrMapOvr>
-  <mc:AlternateContent xmlns:mc="http://schemas.openxmlformats.org/markup-compatibility/2006" xmlns:p14="http://schemas.microsoft.com/office/powerpoint/2010/main">
-    <mc:Choice Requires="p14">
-      <p:transition spd="slow" p14:dur="2000"/>
-    </mc:Choice>
-    <mc:Fallback xmlns="">
-      <p:transition spd="slow"/>
-    </mc:Fallback>
-  </mc:AlternateContent>
-  <p:timing>
-    <p:tnLst>
-      <p:par>
-        <p:cTn id="1" dur="indefinite" restart="never" nodeType="tmRoot"/>
-      </p:par>
-    </p:tnLst>
-  </p:timing>
-</p:sld>
-</file>
-
-<file path=ppt/slides/slide30.xml><?xml version="1.0" encoding="utf-8"?>
+<file path=ppt/slides/slide29.xml><?xml version="1.0" encoding="utf-8"?>
 <p:sld xmlns:a="http://schemas.openxmlformats.org/drawingml/2006/main" xmlns:r="http://schemas.openxmlformats.org/officeDocument/2006/relationships" xmlns:p="http://schemas.openxmlformats.org/presentationml/2006/main">
   <p:cSld>
     <p:spTree>
@@ -19703,6 +17541,882 @@
 </p:sld>
 </file>
 
+<file path=ppt/slides/slide3.xml><?xml version="1.0" encoding="utf-8"?>
+<p:sld xmlns:a="http://schemas.openxmlformats.org/drawingml/2006/main" xmlns:r="http://schemas.openxmlformats.org/officeDocument/2006/relationships" xmlns:p="http://schemas.openxmlformats.org/presentationml/2006/main">
+  <p:cSld>
+    <p:spTree>
+      <p:nvGrpSpPr>
+        <p:cNvPr id="1" name=""/>
+        <p:cNvGrpSpPr/>
+        <p:nvPr/>
+      </p:nvGrpSpPr>
+      <p:grpSpPr>
+        <a:xfrm>
+          <a:off x="0" y="0"/>
+          <a:ext cx="0" cy="0"/>
+          <a:chOff x="0" y="0"/>
+          <a:chExt cx="0" cy="0"/>
+        </a:xfrm>
+      </p:grpSpPr>
+      <p:sp>
+        <p:nvSpPr>
+          <p:cNvPr id="2" name="Title 1"/>
+          <p:cNvSpPr>
+            <a:spLocks noGrp="1"/>
+          </p:cNvSpPr>
+          <p:nvPr>
+            <p:ph type="title"/>
+          </p:nvPr>
+        </p:nvSpPr>
+        <p:spPr>
+          <a:xfrm>
+            <a:off x="830179" y="190973"/>
+            <a:ext cx="10674433" cy="964058"/>
+          </a:xfrm>
+        </p:spPr>
+        <p:txBody>
+          <a:bodyPr>
+            <a:normAutofit/>
+          </a:bodyPr>
+          <a:lstStyle/>
+          <a:p>
+            <a:pPr algn="r" rtl="1"/>
+            <a:r>
+              <a:rPr lang="fa-IR" sz="6000" b="1" dirty="0">
+                <a:solidFill>
+                  <a:schemeClr val="accent6">
+                    <a:lumMod val="75000"/>
+                  </a:schemeClr>
+                </a:solidFill>
+                <a:effectLst>
+                  <a:outerShdw blurRad="38100" dist="38100" dir="2700000" algn="tl">
+                    <a:srgbClr val="000000">
+                      <a:alpha val="43137"/>
+                    </a:srgbClr>
+                  </a:outerShdw>
+                </a:effectLst>
+                <a:latin typeface="B Nazanin+ Regular" panose="01000506000000020004" pitchFamily="2" charset="-78"/>
+                <a:cs typeface="B Nazanin+ Regular" panose="01000506000000020004" pitchFamily="2" charset="-78"/>
+              </a:rPr>
+              <a:t>چارچوب </a:t>
+            </a:r>
+            <a:endParaRPr lang="en-US" sz="6000" b="1" dirty="0">
+              <a:effectLst>
+                <a:outerShdw blurRad="38100" dist="38100" dir="2700000" algn="tl">
+                  <a:srgbClr val="000000">
+                    <a:alpha val="43137"/>
+                  </a:srgbClr>
+                </a:outerShdw>
+              </a:effectLst>
+              <a:latin typeface="B Nazanin+ Regular" panose="01000506000000020004" pitchFamily="2" charset="-78"/>
+              <a:cs typeface="B Nazanin+ Regular" panose="01000506000000020004" pitchFamily="2" charset="-78"/>
+            </a:endParaRPr>
+          </a:p>
+        </p:txBody>
+      </p:sp>
+      <p:sp>
+        <p:nvSpPr>
+          <p:cNvPr id="3" name="Content Placeholder 2"/>
+          <p:cNvSpPr>
+            <a:spLocks noGrp="1"/>
+          </p:cNvSpPr>
+          <p:nvPr>
+            <p:ph idx="1"/>
+          </p:nvPr>
+        </p:nvSpPr>
+        <p:spPr>
+          <a:xfrm>
+            <a:off x="2081463" y="1155031"/>
+            <a:ext cx="9423149" cy="5558590"/>
+          </a:xfrm>
+        </p:spPr>
+        <p:txBody>
+          <a:bodyPr>
+            <a:noAutofit/>
+          </a:bodyPr>
+          <a:lstStyle/>
+          <a:p>
+            <a:pPr algn="r" rtl="1">
+              <a:lnSpc>
+                <a:spcPct val="100000"/>
+              </a:lnSpc>
+              <a:buFont typeface="Wingdings" panose="05000000000000000000" pitchFamily="2" charset="2"/>
+              <a:buChar char="ü"/>
+            </a:pPr>
+            <a:r>
+              <a:rPr lang="en-US" sz="4000" b="1" dirty="0" smtClean="0">
+                <a:solidFill>
+                  <a:schemeClr val="tx1"/>
+                </a:solidFill>
+                <a:effectLst>
+                  <a:outerShdw blurRad="38100" dist="38100" dir="2700000" algn="tl">
+                    <a:srgbClr val="000000">
+                      <a:alpha val="43137"/>
+                    </a:srgbClr>
+                  </a:outerShdw>
+                </a:effectLst>
+                <a:latin typeface="B Nazanin+ Regular" panose="01000506000000020004" pitchFamily="2" charset="-78"/>
+                <a:cs typeface="B Nazanin+ Regular" panose="01000506000000020004" pitchFamily="2" charset="-78"/>
+              </a:rPr>
+              <a:t>  </a:t>
+            </a:r>
+            <a:r>
+              <a:rPr lang="fa-IR" sz="4000" b="1" dirty="0" smtClean="0">
+                <a:solidFill>
+                  <a:schemeClr val="tx1"/>
+                </a:solidFill>
+                <a:effectLst>
+                  <a:outerShdw blurRad="38100" dist="38100" dir="2700000" algn="tl">
+                    <a:srgbClr val="000000">
+                      <a:alpha val="43137"/>
+                    </a:srgbClr>
+                  </a:outerShdw>
+                </a:effectLst>
+                <a:latin typeface="B Nazanin+ Regular" panose="01000506000000020004" pitchFamily="2" charset="-78"/>
+                <a:cs typeface="B Nazanin+ Regular" panose="01000506000000020004" pitchFamily="2" charset="-78"/>
+              </a:rPr>
+              <a:t>مقدمه </a:t>
+            </a:r>
+            <a:endParaRPr lang="fa-IR" sz="4000" b="1" dirty="0" smtClean="0">
+              <a:solidFill>
+                <a:schemeClr val="accent1">
+                  <a:lumMod val="75000"/>
+                </a:schemeClr>
+              </a:solidFill>
+              <a:effectLst>
+                <a:outerShdw blurRad="38100" dist="38100" dir="2700000" algn="tl">
+                  <a:srgbClr val="000000">
+                    <a:alpha val="43137"/>
+                  </a:srgbClr>
+                </a:outerShdw>
+              </a:effectLst>
+              <a:latin typeface="B Nazanin+ Regular" panose="01000506000000020004" pitchFamily="2" charset="-78"/>
+              <a:cs typeface="B Nazanin+ Regular" panose="01000506000000020004" pitchFamily="2" charset="-78"/>
+            </a:endParaRPr>
+          </a:p>
+          <a:p>
+            <a:pPr algn="r" rtl="1">
+              <a:lnSpc>
+                <a:spcPct val="100000"/>
+              </a:lnSpc>
+              <a:buFont typeface="Wingdings" panose="05000000000000000000" pitchFamily="2" charset="2"/>
+              <a:buChar char="ü"/>
+            </a:pPr>
+            <a:r>
+              <a:rPr lang="fa-IR" sz="4000" b="1" dirty="0" smtClean="0">
+                <a:solidFill>
+                  <a:schemeClr val="accent1">
+                    <a:lumMod val="75000"/>
+                  </a:schemeClr>
+                </a:solidFill>
+                <a:effectLst>
+                  <a:outerShdw blurRad="38100" dist="38100" dir="2700000" algn="tl">
+                    <a:srgbClr val="000000">
+                      <a:alpha val="43137"/>
+                    </a:srgbClr>
+                  </a:outerShdw>
+                </a:effectLst>
+                <a:latin typeface="B Nazanin+ Regular" panose="01000506000000020004" pitchFamily="2" charset="-78"/>
+                <a:cs typeface="B Nazanin+ Regular" panose="01000506000000020004" pitchFamily="2" charset="-78"/>
+              </a:rPr>
+              <a:t> </a:t>
+            </a:r>
+            <a:r>
+              <a:rPr lang="en-US" sz="4000" b="1" dirty="0" smtClean="0">
+                <a:solidFill>
+                  <a:schemeClr val="accent1">
+                    <a:lumMod val="75000"/>
+                  </a:schemeClr>
+                </a:solidFill>
+                <a:effectLst>
+                  <a:outerShdw blurRad="38100" dist="38100" dir="2700000" algn="tl">
+                    <a:srgbClr val="000000">
+                      <a:alpha val="43137"/>
+                    </a:srgbClr>
+                  </a:outerShdw>
+                </a:effectLst>
+                <a:latin typeface="B Nazanin+ Regular" panose="01000506000000020004" pitchFamily="2" charset="-78"/>
+                <a:cs typeface="B Nazanin+ Regular" panose="01000506000000020004" pitchFamily="2" charset="-78"/>
+              </a:rPr>
+              <a:t> </a:t>
+            </a:r>
+            <a:r>
+              <a:rPr lang="fa-IR" sz="4000" b="1" dirty="0" smtClean="0">
+                <a:solidFill>
+                  <a:schemeClr val="accent1">
+                    <a:lumMod val="75000"/>
+                  </a:schemeClr>
+                </a:solidFill>
+                <a:effectLst>
+                  <a:outerShdw blurRad="38100" dist="38100" dir="2700000" algn="tl">
+                    <a:srgbClr val="000000">
+                      <a:alpha val="43137"/>
+                    </a:srgbClr>
+                  </a:outerShdw>
+                </a:effectLst>
+                <a:latin typeface="B Nazanin+ Regular" panose="01000506000000020004" pitchFamily="2" charset="-78"/>
+                <a:cs typeface="B Nazanin+ Regular" panose="01000506000000020004" pitchFamily="2" charset="-78"/>
+              </a:rPr>
+              <a:t>پروکسی سرور (</a:t>
+            </a:r>
+            <a:r>
+              <a:rPr lang="en-US" sz="4000" b="1" dirty="0" smtClean="0">
+                <a:solidFill>
+                  <a:schemeClr val="accent1">
+                    <a:lumMod val="75000"/>
+                  </a:schemeClr>
+                </a:solidFill>
+                <a:effectLst>
+                  <a:outerShdw blurRad="38100" dist="38100" dir="2700000" algn="tl">
+                    <a:srgbClr val="000000">
+                      <a:alpha val="43137"/>
+                    </a:srgbClr>
+                  </a:outerShdw>
+                </a:effectLst>
+                <a:latin typeface="B Nazanin+ Regular" panose="01000506000000020004" pitchFamily="2" charset="-78"/>
+                <a:cs typeface="B Nazanin+ Regular" panose="01000506000000020004" pitchFamily="2" charset="-78"/>
+              </a:rPr>
+              <a:t>proxy</a:t>
+            </a:r>
+            <a:r>
+              <a:rPr lang="fa-IR" sz="4000" b="1" dirty="0" smtClean="0">
+                <a:solidFill>
+                  <a:schemeClr val="accent1">
+                    <a:lumMod val="75000"/>
+                  </a:schemeClr>
+                </a:solidFill>
+                <a:effectLst>
+                  <a:outerShdw blurRad="38100" dist="38100" dir="2700000" algn="tl">
+                    <a:srgbClr val="000000">
+                      <a:alpha val="43137"/>
+                    </a:srgbClr>
+                  </a:outerShdw>
+                </a:effectLst>
+                <a:latin typeface="B Nazanin+ Regular" panose="01000506000000020004" pitchFamily="2" charset="-78"/>
+                <a:cs typeface="B Nazanin+ Regular" panose="01000506000000020004" pitchFamily="2" charset="-78"/>
+              </a:rPr>
+              <a:t>)</a:t>
+            </a:r>
+            <a:endParaRPr lang="en-US" sz="4000" b="1" dirty="0" smtClean="0">
+              <a:solidFill>
+                <a:schemeClr val="accent1">
+                  <a:lumMod val="75000"/>
+                </a:schemeClr>
+              </a:solidFill>
+              <a:effectLst>
+                <a:outerShdw blurRad="38100" dist="38100" dir="2700000" algn="tl">
+                  <a:srgbClr val="000000">
+                    <a:alpha val="43137"/>
+                  </a:srgbClr>
+                </a:outerShdw>
+              </a:effectLst>
+              <a:latin typeface="B Nazanin+ Regular" panose="01000506000000020004" pitchFamily="2" charset="-78"/>
+              <a:cs typeface="B Nazanin+ Regular" panose="01000506000000020004" pitchFamily="2" charset="-78"/>
+            </a:endParaRPr>
+          </a:p>
+          <a:p>
+            <a:pPr algn="r" rtl="1">
+              <a:lnSpc>
+                <a:spcPct val="100000"/>
+              </a:lnSpc>
+              <a:buFont typeface="Wingdings" panose="05000000000000000000" pitchFamily="2" charset="2"/>
+              <a:buChar char="ü"/>
+            </a:pPr>
+            <a:r>
+              <a:rPr lang="fa-IR" sz="4000" b="1" dirty="0" smtClean="0">
+                <a:solidFill>
+                  <a:schemeClr val="accent1">
+                    <a:lumMod val="75000"/>
+                  </a:schemeClr>
+                </a:solidFill>
+                <a:effectLst>
+                  <a:outerShdw blurRad="38100" dist="38100" dir="2700000" algn="tl">
+                    <a:srgbClr val="000000">
+                      <a:alpha val="43137"/>
+                    </a:srgbClr>
+                  </a:outerShdw>
+                </a:effectLst>
+                <a:latin typeface="B Nazanin+ Regular" panose="01000506000000020004" pitchFamily="2" charset="-78"/>
+                <a:cs typeface="B Nazanin+ Regular" panose="01000506000000020004" pitchFamily="2" charset="-78"/>
+              </a:rPr>
+              <a:t>  </a:t>
+            </a:r>
+            <a:r>
+              <a:rPr lang="en-US" sz="4000" b="1" dirty="0" smtClean="0">
+                <a:solidFill>
+                  <a:schemeClr val="accent1">
+                    <a:lumMod val="75000"/>
+                  </a:schemeClr>
+                </a:solidFill>
+                <a:effectLst>
+                  <a:outerShdw blurRad="38100" dist="38100" dir="2700000" algn="tl">
+                    <a:srgbClr val="000000">
+                      <a:alpha val="43137"/>
+                    </a:srgbClr>
+                  </a:outerShdw>
+                </a:effectLst>
+                <a:latin typeface="B Nazanin+ Regular" panose="01000506000000020004" pitchFamily="2" charset="-78"/>
+                <a:cs typeface="B Nazanin+ Regular" panose="01000506000000020004" pitchFamily="2" charset="-78"/>
+              </a:rPr>
+              <a:t> HTTPS</a:t>
+            </a:r>
+            <a:r>
+              <a:rPr lang="fa-IR" sz="4000" b="1" dirty="0" smtClean="0">
+                <a:solidFill>
+                  <a:schemeClr val="accent1">
+                    <a:lumMod val="75000"/>
+                  </a:schemeClr>
+                </a:solidFill>
+                <a:effectLst>
+                  <a:outerShdw blurRad="38100" dist="38100" dir="2700000" algn="tl">
+                    <a:srgbClr val="000000">
+                      <a:alpha val="43137"/>
+                    </a:srgbClr>
+                  </a:outerShdw>
+                </a:effectLst>
+                <a:latin typeface="B Nazanin+ Regular" panose="01000506000000020004" pitchFamily="2" charset="-78"/>
+                <a:cs typeface="B Nazanin+ Regular" panose="01000506000000020004" pitchFamily="2" charset="-78"/>
+              </a:rPr>
+              <a:t> </a:t>
+            </a:r>
+            <a:endParaRPr lang="en-US" sz="4000" b="1" dirty="0" smtClean="0">
+              <a:solidFill>
+                <a:schemeClr val="accent1">
+                  <a:lumMod val="75000"/>
+                </a:schemeClr>
+              </a:solidFill>
+              <a:effectLst>
+                <a:outerShdw blurRad="38100" dist="38100" dir="2700000" algn="tl">
+                  <a:srgbClr val="000000">
+                    <a:alpha val="43137"/>
+                  </a:srgbClr>
+                </a:outerShdw>
+              </a:effectLst>
+              <a:latin typeface="B Nazanin+ Regular" panose="01000506000000020004" pitchFamily="2" charset="-78"/>
+              <a:cs typeface="B Nazanin+ Regular" panose="01000506000000020004" pitchFamily="2" charset="-78"/>
+            </a:endParaRPr>
+          </a:p>
+          <a:p>
+            <a:pPr algn="r" rtl="1">
+              <a:lnSpc>
+                <a:spcPct val="100000"/>
+              </a:lnSpc>
+              <a:buFont typeface="Wingdings" panose="05000000000000000000" pitchFamily="2" charset="2"/>
+              <a:buChar char="ü"/>
+            </a:pPr>
+            <a:r>
+              <a:rPr lang="en-US" sz="4000" b="1" dirty="0" smtClean="0">
+                <a:solidFill>
+                  <a:schemeClr val="accent1">
+                    <a:lumMod val="75000"/>
+                  </a:schemeClr>
+                </a:solidFill>
+                <a:effectLst>
+                  <a:outerShdw blurRad="38100" dist="38100" dir="2700000" algn="tl">
+                    <a:srgbClr val="000000">
+                      <a:alpha val="43137"/>
+                    </a:srgbClr>
+                  </a:outerShdw>
+                </a:effectLst>
+                <a:latin typeface="B Nazanin+ Regular" panose="01000506000000020004" pitchFamily="2" charset="-78"/>
+                <a:cs typeface="B Nazanin+ Regular" panose="01000506000000020004" pitchFamily="2" charset="-78"/>
+              </a:rPr>
+              <a:t> TLS  </a:t>
+            </a:r>
+            <a:r>
+              <a:rPr lang="fa-IR" sz="4000" b="1" dirty="0" smtClean="0">
+                <a:solidFill>
+                  <a:schemeClr val="accent1">
+                    <a:lumMod val="75000"/>
+                  </a:schemeClr>
+                </a:solidFill>
+                <a:effectLst>
+                  <a:outerShdw blurRad="38100" dist="38100" dir="2700000" algn="tl">
+                    <a:srgbClr val="000000">
+                      <a:alpha val="43137"/>
+                    </a:srgbClr>
+                  </a:outerShdw>
+                </a:effectLst>
+                <a:latin typeface="B Nazanin+ Regular" panose="01000506000000020004" pitchFamily="2" charset="-78"/>
+                <a:cs typeface="B Nazanin+ Regular" panose="01000506000000020004" pitchFamily="2" charset="-78"/>
+              </a:rPr>
+              <a:t>و </a:t>
+            </a:r>
+            <a:r>
+              <a:rPr lang="en-US" sz="4000" b="1" dirty="0" smtClean="0">
+                <a:solidFill>
+                  <a:schemeClr val="accent1">
+                    <a:lumMod val="75000"/>
+                  </a:schemeClr>
+                </a:solidFill>
+                <a:effectLst>
+                  <a:outerShdw blurRad="38100" dist="38100" dir="2700000" algn="tl">
+                    <a:srgbClr val="000000">
+                      <a:alpha val="43137"/>
+                    </a:srgbClr>
+                  </a:outerShdw>
+                </a:effectLst>
+                <a:latin typeface="B Nazanin+ Regular" panose="01000506000000020004" pitchFamily="2" charset="-78"/>
+                <a:cs typeface="B Nazanin+ Regular" panose="01000506000000020004" pitchFamily="2" charset="-78"/>
+              </a:rPr>
+              <a:t>SSL</a:t>
+            </a:r>
+          </a:p>
+          <a:p>
+            <a:pPr algn="r" rtl="1">
+              <a:lnSpc>
+                <a:spcPct val="100000"/>
+              </a:lnSpc>
+              <a:buFont typeface="Wingdings" panose="05000000000000000000" pitchFamily="2" charset="2"/>
+              <a:buChar char="ü"/>
+            </a:pPr>
+            <a:r>
+              <a:rPr lang="en-US" sz="4000" b="1" dirty="0">
+                <a:solidFill>
+                  <a:schemeClr val="accent1">
+                    <a:lumMod val="75000"/>
+                  </a:schemeClr>
+                </a:solidFill>
+                <a:effectLst>
+                  <a:outerShdw blurRad="38100" dist="38100" dir="2700000" algn="tl">
+                    <a:srgbClr val="000000">
+                      <a:alpha val="43137"/>
+                    </a:srgbClr>
+                  </a:outerShdw>
+                </a:effectLst>
+                <a:latin typeface="B Nazanin+ Regular" panose="01000506000000020004" pitchFamily="2" charset="-78"/>
+                <a:cs typeface="B Nazanin+ Regular" panose="01000506000000020004" pitchFamily="2" charset="-78"/>
+              </a:rPr>
+              <a:t> </a:t>
+            </a:r>
+            <a:r>
+              <a:rPr lang="fa-IR" sz="4000" b="1" dirty="0" smtClean="0">
+                <a:solidFill>
+                  <a:schemeClr val="accent1">
+                    <a:lumMod val="75000"/>
+                  </a:schemeClr>
+                </a:solidFill>
+                <a:effectLst>
+                  <a:outerShdw blurRad="38100" dist="38100" dir="2700000" algn="tl">
+                    <a:srgbClr val="000000">
+                      <a:alpha val="43137"/>
+                    </a:srgbClr>
+                  </a:outerShdw>
+                </a:effectLst>
+                <a:latin typeface="B Nazanin+ Regular" panose="01000506000000020004" pitchFamily="2" charset="-78"/>
+                <a:cs typeface="B Nazanin+ Regular" panose="01000506000000020004" pitchFamily="2" charset="-78"/>
+              </a:rPr>
+              <a:t> رمز گذاری</a:t>
+            </a:r>
+          </a:p>
+          <a:p>
+            <a:pPr algn="r" rtl="1">
+              <a:lnSpc>
+                <a:spcPct val="100000"/>
+              </a:lnSpc>
+              <a:buFont typeface="Wingdings" panose="05000000000000000000" pitchFamily="2" charset="2"/>
+              <a:buChar char="ü"/>
+            </a:pPr>
+            <a:r>
+              <a:rPr lang="fa-IR" sz="4000" b="1" dirty="0" smtClean="0">
+                <a:solidFill>
+                  <a:schemeClr val="accent1">
+                    <a:lumMod val="75000"/>
+                  </a:schemeClr>
+                </a:solidFill>
+                <a:effectLst>
+                  <a:outerShdw blurRad="38100" dist="38100" dir="2700000" algn="tl">
+                    <a:srgbClr val="000000">
+                      <a:alpha val="43137"/>
+                    </a:srgbClr>
+                  </a:outerShdw>
+                </a:effectLst>
+                <a:latin typeface="B Nazanin+ Regular" panose="01000506000000020004" pitchFamily="2" charset="-78"/>
+                <a:cs typeface="B Nazanin+ Regular" panose="01000506000000020004" pitchFamily="2" charset="-78"/>
+              </a:rPr>
+              <a:t>  نتیجه گیری </a:t>
+            </a:r>
+            <a:endParaRPr lang="en-US" sz="4000" b="1" dirty="0" smtClean="0">
+              <a:solidFill>
+                <a:schemeClr val="accent1">
+                  <a:lumMod val="75000"/>
+                </a:schemeClr>
+              </a:solidFill>
+              <a:effectLst>
+                <a:outerShdw blurRad="38100" dist="38100" dir="2700000" algn="tl">
+                  <a:srgbClr val="000000">
+                    <a:alpha val="43137"/>
+                  </a:srgbClr>
+                </a:outerShdw>
+              </a:effectLst>
+              <a:latin typeface="B Nazanin+ Regular" panose="01000506000000020004" pitchFamily="2" charset="-78"/>
+              <a:cs typeface="B Nazanin+ Regular" panose="01000506000000020004" pitchFamily="2" charset="-78"/>
+            </a:endParaRPr>
+          </a:p>
+          <a:p>
+            <a:pPr algn="r" rtl="1">
+              <a:lnSpc>
+                <a:spcPct val="100000"/>
+              </a:lnSpc>
+              <a:buFont typeface="Wingdings" panose="05000000000000000000" pitchFamily="2" charset="2"/>
+              <a:buChar char="ü"/>
+            </a:pPr>
+            <a:r>
+              <a:rPr lang="fa-IR" sz="4000" b="1" dirty="0" smtClean="0">
+                <a:solidFill>
+                  <a:schemeClr val="accent1">
+                    <a:lumMod val="75000"/>
+                  </a:schemeClr>
+                </a:solidFill>
+                <a:effectLst>
+                  <a:outerShdw blurRad="38100" dist="38100" dir="2700000" algn="tl">
+                    <a:srgbClr val="000000">
+                      <a:alpha val="43137"/>
+                    </a:srgbClr>
+                  </a:outerShdw>
+                </a:effectLst>
+                <a:latin typeface="B Nazanin+ Regular" panose="01000506000000020004" pitchFamily="2" charset="-78"/>
+                <a:cs typeface="B Nazanin+ Regular" panose="01000506000000020004" pitchFamily="2" charset="-78"/>
+              </a:rPr>
+              <a:t>  مراجع </a:t>
+            </a:r>
+            <a:endParaRPr lang="en-US" sz="4000" b="1" dirty="0">
+              <a:solidFill>
+                <a:schemeClr val="accent1">
+                  <a:lumMod val="75000"/>
+                </a:schemeClr>
+              </a:solidFill>
+              <a:effectLst>
+                <a:outerShdw blurRad="38100" dist="38100" dir="2700000" algn="tl">
+                  <a:srgbClr val="000000">
+                    <a:alpha val="43137"/>
+                  </a:srgbClr>
+                </a:outerShdw>
+              </a:effectLst>
+              <a:latin typeface="B Nazanin+ Regular" panose="01000506000000020004" pitchFamily="2" charset="-78"/>
+              <a:cs typeface="B Nazanin+ Regular" panose="01000506000000020004" pitchFamily="2" charset="-78"/>
+            </a:endParaRPr>
+          </a:p>
+        </p:txBody>
+      </p:sp>
+    </p:spTree>
+    <p:extLst>
+      <p:ext uri="{BB962C8B-B14F-4D97-AF65-F5344CB8AC3E}">
+        <p14:creationId xmlns:p14="http://schemas.microsoft.com/office/powerpoint/2010/main" val="2616989132"/>
+      </p:ext>
+    </p:extLst>
+  </p:cSld>
+  <p:clrMapOvr>
+    <a:masterClrMapping/>
+  </p:clrMapOvr>
+  <mc:AlternateContent xmlns:mc="http://schemas.openxmlformats.org/markup-compatibility/2006" xmlns:p14="http://schemas.microsoft.com/office/powerpoint/2010/main">
+    <mc:Choice Requires="p14">
+      <p:transition spd="slow" p14:dur="2000"/>
+    </mc:Choice>
+    <mc:Fallback xmlns="">
+      <p:transition spd="slow"/>
+    </mc:Fallback>
+  </mc:AlternateContent>
+  <p:timing>
+    <p:tnLst>
+      <p:par>
+        <p:cTn id="1" dur="indefinite" restart="never" nodeType="tmRoot"/>
+      </p:par>
+    </p:tnLst>
+  </p:timing>
+</p:sld>
+</file>
+
+<file path=ppt/slides/slide30.xml><?xml version="1.0" encoding="utf-8"?>
+<p:sld xmlns:a="http://schemas.openxmlformats.org/drawingml/2006/main" xmlns:r="http://schemas.openxmlformats.org/officeDocument/2006/relationships" xmlns:p="http://schemas.openxmlformats.org/presentationml/2006/main">
+  <p:cSld>
+    <p:spTree>
+      <p:nvGrpSpPr>
+        <p:cNvPr id="1" name=""/>
+        <p:cNvGrpSpPr/>
+        <p:nvPr/>
+      </p:nvGrpSpPr>
+      <p:grpSpPr>
+        <a:xfrm>
+          <a:off x="0" y="0"/>
+          <a:ext cx="0" cy="0"/>
+          <a:chOff x="0" y="0"/>
+          <a:chExt cx="0" cy="0"/>
+        </a:xfrm>
+      </p:grpSpPr>
+      <p:sp>
+        <p:nvSpPr>
+          <p:cNvPr id="2" name="Title 1"/>
+          <p:cNvSpPr>
+            <a:spLocks noGrp="1"/>
+          </p:cNvSpPr>
+          <p:nvPr>
+            <p:ph type="title"/>
+          </p:nvPr>
+        </p:nvSpPr>
+        <p:spPr>
+          <a:xfrm>
+            <a:off x="2592925" y="407542"/>
+            <a:ext cx="8911687" cy="964058"/>
+          </a:xfrm>
+        </p:spPr>
+        <p:txBody>
+          <a:bodyPr>
+            <a:normAutofit/>
+          </a:bodyPr>
+          <a:lstStyle/>
+          <a:p>
+            <a:pPr algn="r" rtl="1"/>
+            <a:r>
+              <a:rPr lang="fa-IR" sz="4800" b="1" dirty="0" smtClean="0">
+                <a:solidFill>
+                  <a:schemeClr val="accent6">
+                    <a:lumMod val="75000"/>
+                  </a:schemeClr>
+                </a:solidFill>
+                <a:latin typeface="B Nazanin+ Regular" panose="01000506000000020004" pitchFamily="2" charset="-78"/>
+                <a:cs typeface="B Nazanin+ Regular" panose="01000506000000020004" pitchFamily="2" charset="-78"/>
+              </a:rPr>
+              <a:t> </a:t>
+            </a:r>
+            <a:endParaRPr lang="en-US" sz="4800" b="1" dirty="0">
+              <a:solidFill>
+                <a:schemeClr val="accent6">
+                  <a:lumMod val="75000"/>
+                </a:schemeClr>
+              </a:solidFill>
+              <a:latin typeface="B Nazanin+ Regular" panose="01000506000000020004" pitchFamily="2" charset="-78"/>
+              <a:cs typeface="B Nazanin+ Regular" panose="01000506000000020004" pitchFamily="2" charset="-78"/>
+            </a:endParaRPr>
+          </a:p>
+        </p:txBody>
+      </p:sp>
+      <p:sp>
+        <p:nvSpPr>
+          <p:cNvPr id="3" name="Content Placeholder 2"/>
+          <p:cNvSpPr>
+            <a:spLocks noGrp="1"/>
+          </p:cNvSpPr>
+          <p:nvPr>
+            <p:ph idx="1"/>
+          </p:nvPr>
+        </p:nvSpPr>
+        <p:spPr>
+          <a:xfrm>
+            <a:off x="1503947" y="1371600"/>
+            <a:ext cx="10000665" cy="5125453"/>
+          </a:xfrm>
+        </p:spPr>
+        <p:txBody>
+          <a:bodyPr>
+            <a:noAutofit/>
+          </a:bodyPr>
+          <a:lstStyle/>
+          <a:p>
+            <a:pPr marL="0" indent="0" algn="ctr" rtl="1">
+              <a:buNone/>
+            </a:pPr>
+            <a:r>
+              <a:rPr lang="fa-IR" sz="45600" b="1" dirty="0" smtClean="0">
+                <a:solidFill>
+                  <a:schemeClr val="tx1"/>
+                </a:solidFill>
+                <a:latin typeface="B Nazanin+ Regular" panose="01000506000000020004" pitchFamily="2" charset="-78"/>
+                <a:cs typeface="B Nazanin+ Regular" panose="01000506000000020004" pitchFamily="2" charset="-78"/>
+              </a:rPr>
+              <a:t>؟</a:t>
+            </a:r>
+          </a:p>
+        </p:txBody>
+      </p:sp>
+    </p:spTree>
+    <p:extLst>
+      <p:ext uri="{BB962C8B-B14F-4D97-AF65-F5344CB8AC3E}">
+        <p14:creationId xmlns:p14="http://schemas.microsoft.com/office/powerpoint/2010/main" val="3186260478"/>
+      </p:ext>
+    </p:extLst>
+  </p:cSld>
+  <p:clrMapOvr>
+    <a:masterClrMapping/>
+  </p:clrMapOvr>
+  <p:timing>
+    <p:tnLst>
+      <p:par>
+        <p:cTn id="1" dur="indefinite" restart="never" nodeType="tmRoot">
+          <p:childTnLst>
+            <p:seq concurrent="1" nextAc="seek">
+              <p:cTn id="2" dur="indefinite" nodeType="mainSeq">
+                <p:childTnLst>
+                  <p:par>
+                    <p:cTn id="3" fill="hold">
+                      <p:stCondLst>
+                        <p:cond delay="indefinite"/>
+                      </p:stCondLst>
+                      <p:childTnLst>
+                        <p:par>
+                          <p:cTn id="4" fill="hold">
+                            <p:stCondLst>
+                              <p:cond delay="0"/>
+                            </p:stCondLst>
+                            <p:childTnLst>
+                              <p:par>
+                                <p:cTn id="5" presetID="31" presetClass="entr" presetSubtype="0" fill="hold" grpId="0" nodeType="clickEffect">
+                                  <p:stCondLst>
+                                    <p:cond delay="0"/>
+                                  </p:stCondLst>
+                                  <p:childTnLst>
+                                    <p:set>
+                                      <p:cBhvr>
+                                        <p:cTn id="6" dur="1" fill="hold">
+                                          <p:stCondLst>
+                                            <p:cond delay="0"/>
+                                          </p:stCondLst>
+                                        </p:cTn>
+                                        <p:tgtEl>
+                                          <p:spTgt spid="3">
+                                            <p:txEl>
+                                              <p:pRg st="0" end="0"/>
+                                            </p:txEl>
+                                          </p:spTgt>
+                                        </p:tgtEl>
+                                        <p:attrNameLst>
+                                          <p:attrName>style.visibility</p:attrName>
+                                        </p:attrNameLst>
+                                      </p:cBhvr>
+                                      <p:to>
+                                        <p:strVal val="visible"/>
+                                      </p:to>
+                                    </p:set>
+                                    <p:anim calcmode="lin" valueType="num">
+                                      <p:cBhvr>
+                                        <p:cTn id="7" dur="1000" fill="hold"/>
+                                        <p:tgtEl>
+                                          <p:spTgt spid="3">
+                                            <p:txEl>
+                                              <p:pRg st="0" end="0"/>
+                                            </p:txEl>
+                                          </p:spTgt>
+                                        </p:tgtEl>
+                                        <p:attrNameLst>
+                                          <p:attrName>ppt_w</p:attrName>
+                                        </p:attrNameLst>
+                                      </p:cBhvr>
+                                      <p:tavLst>
+                                        <p:tav tm="0">
+                                          <p:val>
+                                            <p:fltVal val="0"/>
+                                          </p:val>
+                                        </p:tav>
+                                        <p:tav tm="100000">
+                                          <p:val>
+                                            <p:strVal val="#ppt_w"/>
+                                          </p:val>
+                                        </p:tav>
+                                      </p:tavLst>
+                                    </p:anim>
+                                    <p:anim calcmode="lin" valueType="num">
+                                      <p:cBhvr>
+                                        <p:cTn id="8" dur="1000" fill="hold"/>
+                                        <p:tgtEl>
+                                          <p:spTgt spid="3">
+                                            <p:txEl>
+                                              <p:pRg st="0" end="0"/>
+                                            </p:txEl>
+                                          </p:spTgt>
+                                        </p:tgtEl>
+                                        <p:attrNameLst>
+                                          <p:attrName>ppt_h</p:attrName>
+                                        </p:attrNameLst>
+                                      </p:cBhvr>
+                                      <p:tavLst>
+                                        <p:tav tm="0">
+                                          <p:val>
+                                            <p:fltVal val="0"/>
+                                          </p:val>
+                                        </p:tav>
+                                        <p:tav tm="100000">
+                                          <p:val>
+                                            <p:strVal val="#ppt_h"/>
+                                          </p:val>
+                                        </p:tav>
+                                      </p:tavLst>
+                                    </p:anim>
+                                    <p:anim calcmode="lin" valueType="num">
+                                      <p:cBhvr>
+                                        <p:cTn id="9" dur="1000" fill="hold"/>
+                                        <p:tgtEl>
+                                          <p:spTgt spid="3">
+                                            <p:txEl>
+                                              <p:pRg st="0" end="0"/>
+                                            </p:txEl>
+                                          </p:spTgt>
+                                        </p:tgtEl>
+                                        <p:attrNameLst>
+                                          <p:attrName>style.rotation</p:attrName>
+                                        </p:attrNameLst>
+                                      </p:cBhvr>
+                                      <p:tavLst>
+                                        <p:tav tm="0">
+                                          <p:val>
+                                            <p:fltVal val="90"/>
+                                          </p:val>
+                                        </p:tav>
+                                        <p:tav tm="100000">
+                                          <p:val>
+                                            <p:fltVal val="0"/>
+                                          </p:val>
+                                        </p:tav>
+                                      </p:tavLst>
+                                    </p:anim>
+                                    <p:animEffect transition="in" filter="fade">
+                                      <p:cBhvr>
+                                        <p:cTn id="10" dur="1000"/>
+                                        <p:tgtEl>
+                                          <p:spTgt spid="3">
+                                            <p:txEl>
+                                              <p:pRg st="0" end="0"/>
+                                            </p:txEl>
+                                          </p:spTgt>
+                                        </p:tgtEl>
+                                      </p:cBhvr>
+                                    </p:animEffect>
+                                  </p:childTnLst>
+                                </p:cTn>
+                              </p:par>
+                            </p:childTnLst>
+                          </p:cTn>
+                        </p:par>
+                      </p:childTnLst>
+                    </p:cTn>
+                  </p:par>
+                </p:childTnLst>
+              </p:cTn>
+              <p:prevCondLst>
+                <p:cond evt="onPrev" delay="0">
+                  <p:tgtEl>
+                    <p:sldTgt/>
+                  </p:tgtEl>
+                </p:cond>
+              </p:prevCondLst>
+              <p:nextCondLst>
+                <p:cond evt="onNext" delay="0">
+                  <p:tgtEl>
+                    <p:sldTgt/>
+                  </p:tgtEl>
+                </p:cond>
+              </p:nextCondLst>
+            </p:seq>
+          </p:childTnLst>
+        </p:cTn>
+      </p:par>
+    </p:tnLst>
+    <p:bldLst>
+      <p:bldP spid="3" grpId="0" build="p"/>
+    </p:bldLst>
+  </p:timing>
+</p:sld>
+</file>
+
 <file path=ppt/slides/slide31.xml><?xml version="1.0" encoding="utf-8"?>
 <p:sld xmlns:a="http://schemas.openxmlformats.org/drawingml/2006/main" xmlns:r="http://schemas.openxmlformats.org/officeDocument/2006/relationships" xmlns:p="http://schemas.openxmlformats.org/presentationml/2006/main">
   <p:cSld>
@@ -19779,8 +18493,8 @@
         </p:nvSpPr>
         <p:spPr>
           <a:xfrm>
-            <a:off x="1503947" y="1371600"/>
-            <a:ext cx="10000665" cy="5125453"/>
+            <a:off x="192505" y="407542"/>
+            <a:ext cx="11730789" cy="6089511"/>
           </a:xfrm>
         </p:spPr>
         <p:txBody>
@@ -19790,19 +18504,20 @@
           <a:lstStyle/>
           <a:p>
             <a:pPr marL="0" indent="0" algn="ctr" rtl="1">
+              <a:lnSpc>
+                <a:spcPct val="150000"/>
+              </a:lnSpc>
               <a:buNone/>
             </a:pPr>
             <a:r>
-              <a:rPr lang="fa-IR" sz="45600" b="1" dirty="0" smtClean="0">
-                <a:solidFill>
-                  <a:schemeClr val="accent6">
-                    <a:lumMod val="75000"/>
-                  </a:schemeClr>
-                </a:solidFill>
-                <a:latin typeface="B Nazanin+ Regular" panose="01000506000000020004" pitchFamily="2" charset="-78"/>
-                <a:cs typeface="B Nazanin+ Regular" panose="01000506000000020004" pitchFamily="2" charset="-78"/>
-              </a:rPr>
-              <a:t>؟</a:t>
+              <a:rPr lang="fa-IR" sz="24000" b="1" dirty="0" smtClean="0">
+                <a:solidFill>
+                  <a:schemeClr val="tx1"/>
+                </a:solidFill>
+                <a:latin typeface="B Nazanin+ Regular" panose="01000506000000020004" pitchFamily="2" charset="-78"/>
+                <a:cs typeface="B Nazanin+ Regular" panose="01000506000000020004" pitchFamily="2" charset="-78"/>
+              </a:rPr>
+              <a:t>تشکر</a:t>
             </a:r>
           </a:p>
         </p:txBody>
@@ -19810,7 +18525,7 @@
     </p:spTree>
     <p:extLst>
       <p:ext uri="{BB962C8B-B14F-4D97-AF65-F5344CB8AC3E}">
-        <p14:creationId xmlns:p14="http://schemas.microsoft.com/office/powerpoint/2010/main" val="3186260478"/>
+        <p14:creationId xmlns:p14="http://schemas.microsoft.com/office/powerpoint/2010/main" val="2917222736"/>
       </p:ext>
     </p:extLst>
   </p:cSld>
@@ -20660,41 +19375,7 @@
                 <a:latin typeface="B Nazanin+ Regular" panose="01000506000000020004" pitchFamily="2" charset="-78"/>
                 <a:cs typeface="B Nazanin+ Regular" panose="01000506000000020004" pitchFamily="2" charset="-78"/>
               </a:rPr>
-              <a:t> نیاز به امنیت در تبادلات </a:t>
-            </a:r>
-            <a:r>
-              <a:rPr lang="fa-IR" sz="4400" b="1" dirty="0" smtClean="0">
-                <a:solidFill>
-                  <a:schemeClr val="tx1"/>
-                </a:solidFill>
-                <a:effectLst>
-                  <a:outerShdw blurRad="38100" dist="38100" dir="2700000" algn="tl">
-                    <a:srgbClr val="000000">
-                      <a:alpha val="43137"/>
-                    </a:srgbClr>
-                  </a:outerShdw>
-                </a:effectLst>
-                <a:latin typeface="B Nazanin+ Regular" panose="01000506000000020004" pitchFamily="2" charset="-78"/>
-                <a:cs typeface="B Nazanin+ Regular" panose="01000506000000020004" pitchFamily="2" charset="-78"/>
-              </a:rPr>
-              <a:t>امروزی، </a:t>
-            </a:r>
-            <a:r>
-              <a:rPr lang="fa-IR" sz="4400" b="1" dirty="0" smtClean="0">
-                <a:solidFill>
-                  <a:schemeClr val="tx1"/>
-                </a:solidFill>
-                <a:effectLst>
-                  <a:outerShdw blurRad="38100" dist="38100" dir="2700000" algn="tl">
-                    <a:srgbClr val="000000">
-                      <a:alpha val="43137"/>
-                    </a:srgbClr>
-                  </a:outerShdw>
-                </a:effectLst>
-                <a:latin typeface="B Nazanin+ Regular" panose="01000506000000020004" pitchFamily="2" charset="-78"/>
-                <a:cs typeface="B Nazanin+ Regular" panose="01000506000000020004" pitchFamily="2" charset="-78"/>
-              </a:rPr>
-              <a:t>امری ضروری است .</a:t>
+              <a:t> نیاز به امنیت در تبادلات امروزی، امری ضروری است .</a:t>
             </a:r>
             <a:endParaRPr lang="en-US" sz="4400" b="1" dirty="0" smtClean="0">
               <a:solidFill>
@@ -21426,43 +20107,8 @@
                 <a:latin typeface="B Nazanin+ Regular" panose="01000506000000020004" pitchFamily="2" charset="-78"/>
                 <a:cs typeface="B Nazanin+ Regular" panose="01000506000000020004" pitchFamily="2" charset="-78"/>
               </a:rPr>
-              <a:t> </a:t>
-            </a:r>
-            <a:r>
-              <a:rPr lang="fa-IR" sz="4000" b="1" dirty="0" smtClean="0">
-                <a:solidFill>
-                  <a:schemeClr val="accent1">
-                    <a:lumMod val="75000"/>
-                  </a:schemeClr>
-                </a:solidFill>
-                <a:effectLst>
-                  <a:outerShdw blurRad="38100" dist="38100" dir="2700000" algn="tl">
-                    <a:srgbClr val="000000">
-                      <a:alpha val="43137"/>
-                    </a:srgbClr>
-                  </a:outerShdw>
-                </a:effectLst>
-                <a:latin typeface="B Nazanin+ Regular" panose="01000506000000020004" pitchFamily="2" charset="-78"/>
-                <a:cs typeface="B Nazanin+ Regular" panose="01000506000000020004" pitchFamily="2" charset="-78"/>
-              </a:rPr>
-              <a:t>رمز گذاری</a:t>
-            </a:r>
-            <a:endParaRPr lang="fa-IR" sz="4000" b="1" dirty="0" smtClean="0">
-              <a:solidFill>
-                <a:schemeClr val="accent1">
-                  <a:lumMod val="75000"/>
-                </a:schemeClr>
-              </a:solidFill>
-              <a:effectLst>
-                <a:outerShdw blurRad="38100" dist="38100" dir="2700000" algn="tl">
-                  <a:srgbClr val="000000">
-                    <a:alpha val="43137"/>
-                  </a:srgbClr>
-                </a:outerShdw>
-              </a:effectLst>
-              <a:latin typeface="B Nazanin+ Regular" panose="01000506000000020004" pitchFamily="2" charset="-78"/>
-              <a:cs typeface="B Nazanin+ Regular" panose="01000506000000020004" pitchFamily="2" charset="-78"/>
-            </a:endParaRPr>
+              <a:t> رمز گذاری</a:t>
+            </a:r>
           </a:p>
           <a:p>
             <a:pPr algn="r" rtl="1">
@@ -21489,26 +20135,7 @@
                 <a:latin typeface="B Nazanin+ Regular" panose="01000506000000020004" pitchFamily="2" charset="-78"/>
                 <a:cs typeface="B Nazanin+ Regular" panose="01000506000000020004" pitchFamily="2" charset="-78"/>
               </a:rPr>
-              <a:t>  </a:t>
-            </a:r>
-            <a:r>
-              <a:rPr lang="fa-IR" sz="4000" b="1" dirty="0" smtClean="0">
-                <a:solidFill>
-                  <a:schemeClr val="accent1">
-                    <a:lumMod val="75000"/>
-                  </a:schemeClr>
-                </a:solidFill>
-                <a:effectLst>
-                  <a:outerShdw blurRad="38100" dist="38100" dir="2700000" algn="tl">
-                    <a:srgbClr val="000000">
-                      <a:alpha val="43137"/>
-                    </a:srgbClr>
-                  </a:outerShdw>
-                </a:effectLst>
-                <a:latin typeface="B Nazanin+ Regular" panose="01000506000000020004" pitchFamily="2" charset="-78"/>
-                <a:cs typeface="B Nazanin+ Regular" panose="01000506000000020004" pitchFamily="2" charset="-78"/>
-              </a:rPr>
-              <a:t>نتیجه گیری </a:t>
+              <a:t>  نتیجه گیری </a:t>
             </a:r>
             <a:endParaRPr lang="en-US" sz="4000" b="1" dirty="0" smtClean="0">
               <a:solidFill>
@@ -21552,26 +20179,7 @@
                 <a:latin typeface="B Nazanin+ Regular" panose="01000506000000020004" pitchFamily="2" charset="-78"/>
                 <a:cs typeface="B Nazanin+ Regular" panose="01000506000000020004" pitchFamily="2" charset="-78"/>
               </a:rPr>
-              <a:t> </a:t>
-            </a:r>
-            <a:r>
-              <a:rPr lang="fa-IR" sz="4000" b="1" dirty="0" smtClean="0">
-                <a:solidFill>
-                  <a:schemeClr val="accent1">
-                    <a:lumMod val="75000"/>
-                  </a:schemeClr>
-                </a:solidFill>
-                <a:effectLst>
-                  <a:outerShdw blurRad="38100" dist="38100" dir="2700000" algn="tl">
-                    <a:srgbClr val="000000">
-                      <a:alpha val="43137"/>
-                    </a:srgbClr>
-                  </a:outerShdw>
-                </a:effectLst>
-                <a:latin typeface="B Nazanin+ Regular" panose="01000506000000020004" pitchFamily="2" charset="-78"/>
-                <a:cs typeface="B Nazanin+ Regular" panose="01000506000000020004" pitchFamily="2" charset="-78"/>
-              </a:rPr>
-              <a:t> مراجع </a:t>
+              <a:t>  مراجع </a:t>
             </a:r>
             <a:endParaRPr lang="en-US" sz="4000" b="1" dirty="0">
               <a:solidFill>
@@ -21794,24 +20402,7 @@
                 <a:latin typeface="B Nazanin+ Regular" panose="01000506000000020004" pitchFamily="2" charset="-78"/>
                 <a:cs typeface="B Nazanin+ Regular" panose="01000506000000020004" pitchFamily="2" charset="-78"/>
               </a:rPr>
-              <a:t>پروکسی </a:t>
-            </a:r>
-            <a:r>
-              <a:rPr lang="fa-IR" sz="4400" b="1" dirty="0" smtClean="0">
-                <a:solidFill>
-                  <a:schemeClr val="tx1"/>
-                </a:solidFill>
-                <a:effectLst>
-                  <a:outerShdw blurRad="38100" dist="38100" dir="2700000" algn="tl">
-                    <a:srgbClr val="000000">
-                      <a:alpha val="43137"/>
-                    </a:srgbClr>
-                  </a:outerShdw>
-                </a:effectLst>
-                <a:latin typeface="B Nazanin+ Regular" panose="01000506000000020004" pitchFamily="2" charset="-78"/>
-                <a:cs typeface="B Nazanin+ Regular" panose="01000506000000020004" pitchFamily="2" charset="-78"/>
-              </a:rPr>
-              <a:t>میان کاربر و سرور قرار می گیرد .</a:t>
+              <a:t>پروکسی میان کاربر و سرور قرار می گیرد .</a:t>
             </a:r>
           </a:p>
           <a:p>
@@ -21874,24 +20465,7 @@
                 <a:latin typeface="B Nazanin+ Regular" panose="01000506000000020004" pitchFamily="2" charset="-78"/>
                 <a:cs typeface="B Nazanin+ Regular" panose="01000506000000020004" pitchFamily="2" charset="-78"/>
               </a:rPr>
-              <a:t> </a:t>
-            </a:r>
-            <a:r>
-              <a:rPr lang="fa-IR" sz="4400" b="1" dirty="0" smtClean="0">
-                <a:solidFill>
-                  <a:schemeClr val="tx1"/>
-                </a:solidFill>
-                <a:effectLst>
-                  <a:outerShdw blurRad="38100" dist="38100" dir="2700000" algn="tl">
-                    <a:srgbClr val="000000">
-                      <a:alpha val="43137"/>
-                    </a:srgbClr>
-                  </a:outerShdw>
-                </a:effectLst>
-                <a:latin typeface="B Nazanin+ Regular" panose="01000506000000020004" pitchFamily="2" charset="-78"/>
-                <a:cs typeface="B Nazanin+ Regular" panose="01000506000000020004" pitchFamily="2" charset="-78"/>
-              </a:rPr>
-              <a:t>برای </a:t>
+              <a:t> برای </a:t>
             </a:r>
             <a:r>
               <a:rPr lang="en-US" sz="4400" b="1" dirty="0" smtClean="0">
@@ -23331,24 +21905,7 @@
                 <a:latin typeface="B Nazanin+ Regular" panose="01000506000000020004" pitchFamily="2" charset="-78"/>
                 <a:cs typeface="B Nazanin+ Regular" panose="01000506000000020004" pitchFamily="2" charset="-78"/>
               </a:rPr>
-              <a:t>حساب </a:t>
-            </a:r>
-            <a:r>
-              <a:rPr lang="fa-IR" sz="4400" b="1" dirty="0" smtClean="0">
-                <a:solidFill>
-                  <a:schemeClr val="tx1"/>
-                </a:solidFill>
-                <a:effectLst>
-                  <a:outerShdw blurRad="38100" dist="38100" dir="2700000" algn="tl">
-                    <a:srgbClr val="000000">
-                      <a:alpha val="43137"/>
-                    </a:srgbClr>
-                  </a:outerShdw>
-                </a:effectLst>
-                <a:latin typeface="B Nazanin+ Regular" panose="01000506000000020004" pitchFamily="2" charset="-78"/>
-                <a:cs typeface="B Nazanin+ Regular" panose="01000506000000020004" pitchFamily="2" charset="-78"/>
-              </a:rPr>
-              <a:t>بری :</a:t>
+              <a:t>حساب بری :</a:t>
             </a:r>
             <a:r>
               <a:rPr lang="fa-IR" sz="4000" b="1" dirty="0" smtClean="0">

</xml_diff>